<commit_message>
docs: README v4 업데이트 및 정리
- README.md 딥러닝 모델 섹션 추가 (2단계 Fine-tuning, Grad-CAM 등)
- 프로젝트 구조에 Model_code, Dataset 상세 추가
- readme_ver4.pdf 생성
- 발표 PPT 업데이트
- 구버전 파일 삭제 (readme_ver3.md/pdf, deployment_guide_v3.md)

🤖 Generated with [Claude Code](https://claude.com/claude-code)

Co-Authored-By: Claude <noreply@anthropic.com>
</commit_message>
<xml_diff>
--- a/Slide/B팀_Claude_뇌출혈 조기 진단 프로젝트.pptx
+++ b/Slide/B팀_Claude_뇌출혈 조기 진단 프로젝트.pptx
@@ -5,7 +5,7 @@
     <p:sldMasterId id="2147483648" r:id="rId1"/>
   </p:sldMasterIdLst>
   <p:notesMasterIdLst>
-    <p:notesMasterId r:id="rId26"/>
+    <p:notesMasterId r:id="rId27"/>
   </p:notesMasterIdLst>
   <p:sldIdLst>
     <p:sldId id="256" r:id="rId2"/>
@@ -27,40 +27,41 @@
     <p:sldId id="313" r:id="rId18"/>
     <p:sldId id="305" r:id="rId19"/>
     <p:sldId id="304" r:id="rId20"/>
-    <p:sldId id="290" r:id="rId21"/>
-    <p:sldId id="291" r:id="rId22"/>
-    <p:sldId id="292" r:id="rId23"/>
-    <p:sldId id="296" r:id="rId24"/>
-    <p:sldId id="297" r:id="rId25"/>
+    <p:sldId id="314" r:id="rId21"/>
+    <p:sldId id="290" r:id="rId22"/>
+    <p:sldId id="291" r:id="rId23"/>
+    <p:sldId id="292" r:id="rId24"/>
+    <p:sldId id="296" r:id="rId25"/>
+    <p:sldId id="297" r:id="rId26"/>
   </p:sldIdLst>
   <p:sldSz cx="24384000" cy="13716000"/>
   <p:notesSz cx="6858000" cy="9144000"/>
   <p:embeddedFontLst>
     <p:embeddedFont>
       <p:font typeface="Calibri" panose="020F0502020204030204" pitchFamily="34" charset="0"/>
-      <p:regular r:id="rId27"/>
-      <p:bold r:id="rId28"/>
-      <p:italic r:id="rId29"/>
-      <p:boldItalic r:id="rId30"/>
+      <p:regular r:id="rId28"/>
+      <p:bold r:id="rId29"/>
+      <p:italic r:id="rId30"/>
+      <p:boldItalic r:id="rId31"/>
     </p:embeddedFont>
     <p:embeddedFont>
       <p:font typeface="Noto Sans KR ExtraBold" panose="020B0200000000000000" pitchFamily="50" charset="-127"/>
-      <p:bold r:id="rId31"/>
+      <p:bold r:id="rId32"/>
     </p:embeddedFont>
     <p:embeddedFont>
       <p:font typeface="Roboto Condensed ExtraBold" panose="02000000000000000000" pitchFamily="2" charset="0"/>
-      <p:bold r:id="rId32"/>
-      <p:boldItalic r:id="rId33"/>
+      <p:bold r:id="rId33"/>
+      <p:boldItalic r:id="rId34"/>
     </p:embeddedFont>
     <p:embeddedFont>
       <p:font typeface="Roboto ExtraBold" panose="02000000000000000000" pitchFamily="2" charset="0"/>
-      <p:bold r:id="rId34"/>
-      <p:boldItalic r:id="rId35"/>
+      <p:bold r:id="rId35"/>
+      <p:boldItalic r:id="rId36"/>
     </p:embeddedFont>
     <p:embeddedFont>
       <p:font typeface="맑은 고딕" panose="020B0503020000020004" pitchFamily="50" charset="-127"/>
-      <p:regular r:id="rId36"/>
-      <p:bold r:id="rId37"/>
+      <p:regular r:id="rId37"/>
+      <p:bold r:id="rId38"/>
     </p:embeddedFont>
   </p:embeddedFontLst>
   <p:defaultTextStyle>
@@ -272,7 +273,7 @@
             <a:fld id="{199B0B15-B3E4-41E0-8C00-BEF0642D7BEB}" type="datetimeFigureOut">
               <a:rPr lang="ko-KR" altLang="en-US" smtClean="0"/>
               <a:pPr/>
-              <a:t>2025-12-04</a:t>
+              <a:t>2025-12-05</a:t>
             </a:fld>
             <a:endParaRPr lang="ko-KR" altLang="en-US"/>
           </a:p>
@@ -1074,7 +1075,7 @@
             <a:fld id="{1D8BD707-D9CF-40AE-B4C6-C98DA3205C09}" type="datetimeFigureOut">
               <a:rPr lang="en-US" smtClean="0"/>
               <a:pPr/>
-              <a:t>12/4/2025</a:t>
+              <a:t>12/5/2025</a:t>
             </a:fld>
             <a:endParaRPr lang="en-US"/>
           </a:p>
@@ -1239,7 +1240,7 @@
             <a:fld id="{1D8BD707-D9CF-40AE-B4C6-C98DA3205C09}" type="datetimeFigureOut">
               <a:rPr lang="en-US" smtClean="0"/>
               <a:pPr/>
-              <a:t>12/4/2025</a:t>
+              <a:t>12/5/2025</a:t>
             </a:fld>
             <a:endParaRPr lang="en-US"/>
           </a:p>
@@ -1414,7 +1415,7 @@
             <a:fld id="{1D8BD707-D9CF-40AE-B4C6-C98DA3205C09}" type="datetimeFigureOut">
               <a:rPr lang="en-US" smtClean="0"/>
               <a:pPr/>
-              <a:t>12/4/2025</a:t>
+              <a:t>12/5/2025</a:t>
             </a:fld>
             <a:endParaRPr lang="en-US"/>
           </a:p>
@@ -1609,7 +1610,7 @@
             <a:fld id="{1D8BD707-D9CF-40AE-B4C6-C98DA3205C09}" type="datetimeFigureOut">
               <a:rPr lang="en-US" smtClean="0"/>
               <a:pPr/>
-              <a:t>12/4/2025</a:t>
+              <a:t>12/5/2025</a:t>
             </a:fld>
             <a:endParaRPr lang="en-US"/>
           </a:p>
@@ -1851,7 +1852,7 @@
             <a:fld id="{1D8BD707-D9CF-40AE-B4C6-C98DA3205C09}" type="datetimeFigureOut">
               <a:rPr lang="en-US" smtClean="0"/>
               <a:pPr/>
-              <a:t>12/4/2025</a:t>
+              <a:t>12/5/2025</a:t>
             </a:fld>
             <a:endParaRPr lang="en-US"/>
           </a:p>
@@ -2133,7 +2134,7 @@
             <a:fld id="{1D8BD707-D9CF-40AE-B4C6-C98DA3205C09}" type="datetimeFigureOut">
               <a:rPr lang="en-US" smtClean="0"/>
               <a:pPr/>
-              <a:t>12/4/2025</a:t>
+              <a:t>12/5/2025</a:t>
             </a:fld>
             <a:endParaRPr lang="en-US"/>
           </a:p>
@@ -2549,7 +2550,7 @@
             <a:fld id="{1D8BD707-D9CF-40AE-B4C6-C98DA3205C09}" type="datetimeFigureOut">
               <a:rPr lang="en-US" smtClean="0"/>
               <a:pPr/>
-              <a:t>12/4/2025</a:t>
+              <a:t>12/5/2025</a:t>
             </a:fld>
             <a:endParaRPr lang="en-US"/>
           </a:p>
@@ -2663,7 +2664,7 @@
             <a:fld id="{1D8BD707-D9CF-40AE-B4C6-C98DA3205C09}" type="datetimeFigureOut">
               <a:rPr lang="en-US" smtClean="0"/>
               <a:pPr/>
-              <a:t>12/4/2025</a:t>
+              <a:t>12/5/2025</a:t>
             </a:fld>
             <a:endParaRPr lang="en-US"/>
           </a:p>
@@ -2755,7 +2756,7 @@
             <a:fld id="{1D8BD707-D9CF-40AE-B4C6-C98DA3205C09}" type="datetimeFigureOut">
               <a:rPr lang="en-US" smtClean="0"/>
               <a:pPr/>
-              <a:t>12/4/2025</a:t>
+              <a:t>12/5/2025</a:t>
             </a:fld>
             <a:endParaRPr lang="en-US"/>
           </a:p>
@@ -3027,7 +3028,7 @@
             <a:fld id="{1D8BD707-D9CF-40AE-B4C6-C98DA3205C09}" type="datetimeFigureOut">
               <a:rPr lang="en-US" smtClean="0"/>
               <a:pPr/>
-              <a:t>12/4/2025</a:t>
+              <a:t>12/5/2025</a:t>
             </a:fld>
             <a:endParaRPr lang="en-US"/>
           </a:p>
@@ -3276,7 +3277,7 @@
             <a:fld id="{1D8BD707-D9CF-40AE-B4C6-C98DA3205C09}" type="datetimeFigureOut">
               <a:rPr lang="en-US" smtClean="0"/>
               <a:pPr/>
-              <a:t>12/4/2025</a:t>
+              <a:t>12/5/2025</a:t>
             </a:fld>
             <a:endParaRPr lang="en-US"/>
           </a:p>
@@ -3484,7 +3485,7 @@
             <a:fld id="{1D8BD707-D9CF-40AE-B4C6-C98DA3205C09}" type="datetimeFigureOut">
               <a:rPr lang="en-US" smtClean="0"/>
               <a:pPr/>
-              <a:t>12/4/2025</a:t>
+              <a:t>12/5/2025</a:t>
             </a:fld>
             <a:endParaRPr lang="en-US"/>
           </a:p>
@@ -9828,7 +9829,21 @@
                 <a:latin typeface="Noto Sans KR ExtraBold" panose="020B0200000000000000" pitchFamily="50" charset="-127"/>
                 <a:ea typeface="Noto Sans KR ExtraBold" panose="020B0200000000000000" pitchFamily="50" charset="-127"/>
               </a:rPr>
-              <a:t>(users) </a:t>
+              <a:t>(</a:t>
+            </a:r>
+            <a:r>
+              <a:rPr lang="en-US" altLang="ko-KR" sz="5400" dirty="0">
+                <a:latin typeface="Roboto Condensed ExtraBold" panose="02000000000000000000" pitchFamily="2" charset="0"/>
+                <a:ea typeface="Roboto Condensed ExtraBold" panose="02000000000000000000" pitchFamily="2" charset="0"/>
+              </a:rPr>
+              <a:t>users</a:t>
+            </a:r>
+            <a:r>
+              <a:rPr lang="en-US" altLang="ko-KR" sz="5400" dirty="0">
+                <a:latin typeface="Noto Sans KR ExtraBold" panose="020B0200000000000000" pitchFamily="50" charset="-127"/>
+                <a:ea typeface="Noto Sans KR ExtraBold" panose="020B0200000000000000" pitchFamily="50" charset="-127"/>
+              </a:rPr>
+              <a:t>) </a:t>
             </a:r>
             <a:r>
               <a:rPr lang="ko-KR" altLang="en-US" sz="5400" dirty="0">
@@ -9948,13 +9963,19 @@
             </a:r>
             <a:r>
               <a:rPr lang="en-US" altLang="ko-KR" sz="5400" dirty="0" err="1">
-                <a:latin typeface="Noto Sans KR ExtraBold" panose="020B0200000000000000" pitchFamily="50" charset="-127"/>
-                <a:ea typeface="Noto Sans KR ExtraBold" panose="020B0200000000000000" pitchFamily="50" charset="-127"/>
+                <a:solidFill>
+                  <a:srgbClr val="FF0000"/>
+                </a:solidFill>
+                <a:latin typeface="Roboto Condensed ExtraBold" panose="02000000000000000000" pitchFamily="2" charset="0"/>
+                <a:ea typeface="Roboto Condensed ExtraBold" panose="02000000000000000000" pitchFamily="2" charset="0"/>
               </a:rPr>
               <a:t>Bcrypt</a:t>
             </a:r>
             <a:r>
               <a:rPr lang="en-US" altLang="ko-KR" sz="5400" dirty="0">
+                <a:solidFill>
+                  <a:srgbClr val="FF0000"/>
+                </a:solidFill>
                 <a:latin typeface="Noto Sans KR ExtraBold" panose="020B0200000000000000" pitchFamily="50" charset="-127"/>
                 <a:ea typeface="Noto Sans KR ExtraBold" panose="020B0200000000000000" pitchFamily="50" charset="-127"/>
               </a:rPr>
@@ -9962,12 +9983,18 @@
             </a:r>
             <a:r>
               <a:rPr lang="ko-KR" altLang="en-US" sz="5400" dirty="0">
+                <a:solidFill>
+                  <a:srgbClr val="FF0000"/>
+                </a:solidFill>
                 <a:latin typeface="Noto Sans KR ExtraBold" panose="020B0200000000000000" pitchFamily="50" charset="-127"/>
                 <a:ea typeface="Noto Sans KR ExtraBold" panose="020B0200000000000000" pitchFamily="50" charset="-127"/>
               </a:rPr>
               <a:t>활용</a:t>
             </a:r>
             <a:endParaRPr lang="en-US" altLang="ko-KR" sz="5400" dirty="0">
+              <a:solidFill>
+                <a:srgbClr val="FF0000"/>
+              </a:solidFill>
               <a:latin typeface="Noto Sans KR ExtraBold" panose="020B0200000000000000" pitchFamily="50" charset="-127"/>
               <a:ea typeface="Noto Sans KR ExtraBold" panose="020B0200000000000000" pitchFamily="50" charset="-127"/>
             </a:endParaRPr>
@@ -10853,16 +10880,6 @@
               </a:lnSpc>
             </a:pPr>
             <a:r>
-              <a:rPr lang="en-US" altLang="ko-KR" sz="6000" spc="-133" dirty="0">
-                <a:solidFill>
-                  <a:srgbClr val="197A52"/>
-                </a:solidFill>
-                <a:latin typeface="Noto Sans KR ExtraBold" panose="020B0200000000000000" pitchFamily="50" charset="-127"/>
-                <a:ea typeface="Noto Sans KR ExtraBold" panose="020B0200000000000000" pitchFamily="50" charset="-127"/>
-              </a:rPr>
-              <a:t>3</a:t>
-            </a:r>
-            <a:r>
               <a:rPr lang="en-US" altLang="ko-KR" sz="6000" b="0" i="0" u="none" strike="noStrike" spc="-133" dirty="0">
                 <a:solidFill>
                   <a:srgbClr val="197A52"/>
@@ -10870,7 +10887,7 @@
                 <a:latin typeface="Noto Sans KR ExtraBold" panose="020B0200000000000000" pitchFamily="50" charset="-127"/>
                 <a:ea typeface="Noto Sans KR ExtraBold" panose="020B0200000000000000" pitchFamily="50" charset="-127"/>
               </a:rPr>
-              <a:t>. </a:t>
+              <a:t>4. </a:t>
             </a:r>
             <a:r>
               <a:rPr lang="ko-KR" altLang="en-US" sz="6000" b="0" i="0" u="none" strike="noStrike" spc="-133" dirty="0" err="1">
@@ -10917,10 +10934,20 @@
                 <a:solidFill>
                   <a:srgbClr val="197A52"/>
                 </a:solidFill>
-                <a:latin typeface="Noto Sans KR ExtraBold" panose="020B0200000000000000" pitchFamily="50" charset="-127"/>
-                <a:ea typeface="Noto Sans KR ExtraBold" panose="020B0200000000000000" pitchFamily="50" charset="-127"/>
-              </a:rPr>
-              <a:t>DB </a:t>
+                <a:latin typeface="Roboto Condensed ExtraBold" panose="02000000000000000000" pitchFamily="2" charset="0"/>
+                <a:ea typeface="Roboto Condensed ExtraBold" panose="02000000000000000000" pitchFamily="2" charset="0"/>
+              </a:rPr>
+              <a:t>DB</a:t>
+            </a:r>
+            <a:r>
+              <a:rPr lang="en-US" altLang="ko-KR" sz="6000" b="0" i="0" u="none" strike="noStrike" spc="-133" dirty="0">
+                <a:solidFill>
+                  <a:srgbClr val="197A52"/>
+                </a:solidFill>
+                <a:latin typeface="Noto Sans KR ExtraBold" panose="020B0200000000000000" pitchFamily="50" charset="-127"/>
+                <a:ea typeface="Noto Sans KR ExtraBold" panose="020B0200000000000000" pitchFamily="50" charset="-127"/>
+              </a:rPr>
+              <a:t> </a:t>
             </a:r>
             <a:r>
               <a:rPr lang="ko-KR" altLang="en-US" sz="6000" b="0" i="0" u="none" strike="noStrike" spc="-133" dirty="0">
@@ -12537,6 +12564,16 @@
               </a:lnSpc>
             </a:pPr>
             <a:r>
+              <a:rPr lang="en-US" altLang="ko-KR" sz="6000" spc="-133" dirty="0">
+                <a:solidFill>
+                  <a:srgbClr val="197A52"/>
+                </a:solidFill>
+                <a:latin typeface="Noto Sans KR ExtraBold" panose="020B0200000000000000" pitchFamily="50" charset="-127"/>
+                <a:ea typeface="Noto Sans KR ExtraBold" panose="020B0200000000000000" pitchFamily="50" charset="-127"/>
+              </a:rPr>
+              <a:t>5</a:t>
+            </a:r>
+            <a:r>
               <a:rPr lang="en-US" altLang="ko-KR" sz="6000" b="0" i="0" u="none" strike="noStrike" spc="-133" dirty="0">
                 <a:solidFill>
                   <a:srgbClr val="197A52"/>
@@ -12544,15 +12581,15 @@
                 <a:latin typeface="Noto Sans KR ExtraBold" panose="020B0200000000000000" pitchFamily="50" charset="-127"/>
                 <a:ea typeface="Noto Sans KR ExtraBold" panose="020B0200000000000000" pitchFamily="50" charset="-127"/>
               </a:rPr>
-              <a:t>4. </a:t>
+              <a:t>. </a:t>
             </a:r>
             <a:r>
               <a:rPr lang="en-US" altLang="ko-KR" sz="6000" spc="-133" dirty="0" err="1">
                 <a:solidFill>
                   <a:srgbClr val="197A52"/>
                 </a:solidFill>
-                <a:latin typeface="Noto Sans KR ExtraBold" panose="020B0200000000000000" pitchFamily="50" charset="-127"/>
-                <a:ea typeface="Noto Sans KR ExtraBold" panose="020B0200000000000000" pitchFamily="50" charset="-127"/>
+                <a:latin typeface="Roboto Condensed ExtraBold" panose="02000000000000000000" pitchFamily="2" charset="0"/>
+                <a:ea typeface="Roboto Condensed ExtraBold" panose="02000000000000000000" pitchFamily="2" charset="0"/>
               </a:rPr>
               <a:t>Streamlit</a:t>
             </a:r>
@@ -12649,14 +12686,44 @@
                 <a:latin typeface="Noto Sans KR ExtraBold" panose="020B0200000000000000" pitchFamily="50" charset="-127"/>
                 <a:ea typeface="Noto Sans KR ExtraBold" panose="020B0200000000000000" pitchFamily="50" charset="-127"/>
               </a:rPr>
-              <a:t>     JWT </a:t>
+              <a:t>     </a:t>
+            </a:r>
+            <a:r>
+              <a:rPr lang="en-US" altLang="ko-KR" sz="5400" dirty="0">
+                <a:solidFill>
+                  <a:srgbClr val="FF0000"/>
+                </a:solidFill>
+                <a:latin typeface="Roboto Condensed ExtraBold" panose="02000000000000000000" pitchFamily="2" charset="0"/>
+                <a:ea typeface="Roboto Condensed ExtraBold" panose="02000000000000000000" pitchFamily="2" charset="0"/>
+              </a:rPr>
+              <a:t>JWT</a:t>
+            </a:r>
+            <a:r>
+              <a:rPr lang="en-US" altLang="ko-KR" sz="5400" dirty="0">
+                <a:solidFill>
+                  <a:srgbClr val="FF0000"/>
+                </a:solidFill>
+                <a:latin typeface="Noto Sans KR ExtraBold" panose="020B0200000000000000" pitchFamily="50" charset="-127"/>
+                <a:ea typeface="Noto Sans KR ExtraBold" panose="020B0200000000000000" pitchFamily="50" charset="-127"/>
+              </a:rPr>
+              <a:t> </a:t>
             </a:r>
             <a:r>
               <a:rPr lang="ko-KR" altLang="en-US" sz="5400" dirty="0">
-                <a:latin typeface="Noto Sans KR ExtraBold" panose="020B0200000000000000" pitchFamily="50" charset="-127"/>
-                <a:ea typeface="Noto Sans KR ExtraBold" panose="020B0200000000000000" pitchFamily="50" charset="-127"/>
-              </a:rPr>
-              <a:t>기반 사용자 인증 및</a:t>
+                <a:solidFill>
+                  <a:srgbClr val="FF0000"/>
+                </a:solidFill>
+                <a:latin typeface="Noto Sans KR ExtraBold" panose="020B0200000000000000" pitchFamily="50" charset="-127"/>
+                <a:ea typeface="Noto Sans KR ExtraBold" panose="020B0200000000000000" pitchFamily="50" charset="-127"/>
+              </a:rPr>
+              <a:t>기반 </a:t>
+            </a:r>
+            <a:r>
+              <a:rPr lang="ko-KR" altLang="en-US" sz="5400" dirty="0">
+                <a:latin typeface="Noto Sans KR ExtraBold" panose="020B0200000000000000" pitchFamily="50" charset="-127"/>
+                <a:ea typeface="Noto Sans KR ExtraBold" panose="020B0200000000000000" pitchFamily="50" charset="-127"/>
+              </a:rPr>
+              <a:t>사용자 인증 및</a:t>
             </a:r>
             <a:endParaRPr lang="en-US" altLang="ko-KR" sz="5400" dirty="0">
               <a:latin typeface="Noto Sans KR ExtraBold" panose="020B0200000000000000" pitchFamily="50" charset="-127"/>
@@ -13593,7 +13660,7 @@
                 <a:latin typeface="Roboto Condensed ExtraBold" panose="02000000000000000000" pitchFamily="2" charset="0"/>
                 <a:ea typeface="Roboto Condensed ExtraBold" panose="02000000000000000000" pitchFamily="2" charset="0"/>
               </a:rPr>
-              <a:t>4. </a:t>
+              <a:t>5. </a:t>
             </a:r>
             <a:r>
               <a:rPr lang="en-US" altLang="ko-KR" sz="6000" spc="-133" dirty="0" err="1">
@@ -13841,7 +13908,27 @@
                 <a:latin typeface="Noto Sans KR ExtraBold" panose="020B0200000000000000" pitchFamily="50" charset="-127"/>
                 <a:ea typeface="Noto Sans KR ExtraBold" panose="020B0200000000000000" pitchFamily="50" charset="-127"/>
               </a:rPr>
-              <a:t>     Grad-CAM </a:t>
+              <a:t>     </a:t>
+            </a:r>
+            <a:r>
+              <a:rPr lang="en-US" altLang="ko-KR" sz="5000" dirty="0">
+                <a:solidFill>
+                  <a:srgbClr val="FF0000"/>
+                </a:solidFill>
+                <a:latin typeface="Roboto Condensed ExtraBold" panose="02000000000000000000" pitchFamily="2" charset="0"/>
+                <a:ea typeface="Roboto Condensed ExtraBold" panose="02000000000000000000" pitchFamily="2" charset="0"/>
+              </a:rPr>
+              <a:t>Grad-CAM</a:t>
+            </a:r>
+            <a:r>
+              <a:rPr lang="en-US" altLang="ko-KR" sz="5000" dirty="0">
+                <a:solidFill>
+                  <a:srgbClr val="FF0000"/>
+                </a:solidFill>
+                <a:latin typeface="Noto Sans KR ExtraBold" panose="020B0200000000000000" pitchFamily="50" charset="-127"/>
+                <a:ea typeface="Noto Sans KR ExtraBold" panose="020B0200000000000000" pitchFamily="50" charset="-127"/>
+              </a:rPr>
+              <a:t> </a:t>
             </a:r>
             <a:r>
               <a:rPr lang="ko-KR" altLang="en-US" sz="5000" dirty="0" err="1">
@@ -13933,7 +14020,7 @@
                 <a:latin typeface="Roboto Condensed ExtraBold" panose="02000000000000000000" pitchFamily="2" charset="0"/>
                 <a:ea typeface="Roboto Condensed ExtraBold" panose="02000000000000000000" pitchFamily="2" charset="0"/>
               </a:rPr>
-              <a:t>4. </a:t>
+              <a:t>5. </a:t>
             </a:r>
             <a:r>
               <a:rPr lang="en-US" altLang="ko-KR" sz="6000" spc="-133" dirty="0" err="1">
@@ -15278,6 +15365,540 @@
 <file path=ppt/slides/slide20.xml><?xml version="1.0" encoding="utf-8"?>
 <p:sld xmlns:a="http://schemas.openxmlformats.org/drawingml/2006/main" xmlns:r="http://schemas.openxmlformats.org/officeDocument/2006/relationships" xmlns:p="http://schemas.openxmlformats.org/presentationml/2006/main">
   <p:cSld>
+    <p:spTree>
+      <p:nvGrpSpPr>
+        <p:cNvPr id="1" name=""/>
+        <p:cNvGrpSpPr/>
+        <p:nvPr/>
+      </p:nvGrpSpPr>
+      <p:grpSpPr>
+        <a:xfrm>
+          <a:off x="0" y="0"/>
+          <a:ext cx="0" cy="0"/>
+          <a:chOff x="0" y="0"/>
+          <a:chExt cx="0" cy="0"/>
+        </a:xfrm>
+      </p:grpSpPr>
+      <p:sp>
+        <p:nvSpPr>
+          <p:cNvPr id="24" name="TextBox 14">
+            <a:extLst>
+              <a:ext uri="{FF2B5EF4-FFF2-40B4-BE49-F238E27FC236}">
+                <a16:creationId xmlns:a16="http://schemas.microsoft.com/office/drawing/2014/main" id="{78BCC73D-3189-4D8B-B658-003D5B3BBF94}"/>
+              </a:ext>
+            </a:extLst>
+          </p:cNvPr>
+          <p:cNvSpPr txBox="1"/>
+          <p:nvPr/>
+        </p:nvSpPr>
+        <p:spPr>
+          <a:xfrm>
+            <a:off x="1320799" y="870236"/>
+            <a:ext cx="8089901" cy="1251989"/>
+          </a:xfrm>
+          <a:prstGeom prst="rect">
+            <a:avLst/>
+          </a:prstGeom>
+        </p:spPr>
+        <p:txBody>
+          <a:bodyPr rtlCol="0" anchor="t"/>
+          <a:lstStyle/>
+          <a:p>
+            <a:pPr lvl="0" algn="l">
+              <a:lnSpc>
+                <a:spcPct val="116199"/>
+              </a:lnSpc>
+            </a:pPr>
+            <a:r>
+              <a:rPr lang="en-US" altLang="ko-KR" sz="7000" spc="-133" dirty="0">
+                <a:latin typeface="Noto Sans KR ExtraBold" panose="020B0200000000000000" pitchFamily="50" charset="-127"/>
+                <a:ea typeface="Noto Sans KR ExtraBold" panose="020B0200000000000000" pitchFamily="50" charset="-127"/>
+              </a:rPr>
+              <a:t>4</a:t>
+            </a:r>
+            <a:r>
+              <a:rPr lang="en-US" altLang="ko-KR" sz="7000" b="0" i="0" u="none" strike="noStrike" spc="-133" dirty="0">
+                <a:latin typeface="Noto Sans KR ExtraBold" panose="020B0200000000000000" pitchFamily="50" charset="-127"/>
+                <a:ea typeface="Noto Sans KR ExtraBold" panose="020B0200000000000000" pitchFamily="50" charset="-127"/>
+              </a:rPr>
+              <a:t>. </a:t>
+            </a:r>
+            <a:r>
+              <a:rPr lang="ko-KR" altLang="en-US" sz="7000" b="0" i="0" u="none" strike="noStrike" spc="-133" dirty="0">
+                <a:latin typeface="Noto Sans KR ExtraBold" panose="020B0200000000000000" pitchFamily="50" charset="-127"/>
+                <a:ea typeface="Noto Sans KR ExtraBold" panose="020B0200000000000000" pitchFamily="50" charset="-127"/>
+              </a:rPr>
+              <a:t>프로젝트 수행 경과</a:t>
+            </a:r>
+            <a:endParaRPr lang="en-US" altLang="ko-KR" sz="7000" b="0" i="0" u="none" strike="noStrike" spc="-133" dirty="0">
+              <a:latin typeface="Noto Sans KR ExtraBold" panose="020B0200000000000000" pitchFamily="50" charset="-127"/>
+              <a:ea typeface="Noto Sans KR ExtraBold" panose="020B0200000000000000" pitchFamily="50" charset="-127"/>
+            </a:endParaRPr>
+          </a:p>
+        </p:txBody>
+      </p:sp>
+      <p:sp>
+        <p:nvSpPr>
+          <p:cNvPr id="29" name="TextBox 28">
+            <a:extLst>
+              <a:ext uri="{FF2B5EF4-FFF2-40B4-BE49-F238E27FC236}">
+                <a16:creationId xmlns:a16="http://schemas.microsoft.com/office/drawing/2014/main" id="{0174959C-DD24-4689-B895-8A60C980FFF8}"/>
+              </a:ext>
+            </a:extLst>
+          </p:cNvPr>
+          <p:cNvSpPr txBox="1"/>
+          <p:nvPr/>
+        </p:nvSpPr>
+        <p:spPr>
+          <a:xfrm>
+            <a:off x="381000" y="4509110"/>
+            <a:ext cx="17449800" cy="4573496"/>
+          </a:xfrm>
+          <a:prstGeom prst="rect">
+            <a:avLst/>
+          </a:prstGeom>
+          <a:noFill/>
+        </p:spPr>
+        <p:txBody>
+          <a:bodyPr wrap="square" rtlCol="0">
+            <a:spAutoFit/>
+          </a:bodyPr>
+          <a:lstStyle/>
+          <a:p>
+            <a:pPr marL="914400" indent="-914400">
+              <a:lnSpc>
+                <a:spcPct val="150000"/>
+              </a:lnSpc>
+              <a:buAutoNum type="arabicParenR"/>
+            </a:pPr>
+            <a:r>
+              <a:rPr lang="ko-KR" altLang="en-US" sz="5000" dirty="0">
+                <a:latin typeface="Noto Sans KR ExtraBold" panose="020B0200000000000000" pitchFamily="50" charset="-127"/>
+                <a:ea typeface="Noto Sans KR ExtraBold" panose="020B0200000000000000" pitchFamily="50" charset="-127"/>
+              </a:rPr>
+              <a:t>서버 구축</a:t>
+            </a:r>
+            <a:endParaRPr lang="en-US" altLang="ko-KR" sz="5000" dirty="0">
+              <a:latin typeface="Noto Sans KR ExtraBold" panose="020B0200000000000000" pitchFamily="50" charset="-127"/>
+              <a:ea typeface="Noto Sans KR ExtraBold" panose="020B0200000000000000" pitchFamily="50" charset="-127"/>
+            </a:endParaRPr>
+          </a:p>
+          <a:p>
+            <a:pPr>
+              <a:lnSpc>
+                <a:spcPct val="150000"/>
+              </a:lnSpc>
+            </a:pPr>
+            <a:r>
+              <a:rPr lang="en-US" altLang="ko-KR" sz="5000" dirty="0">
+                <a:latin typeface="Noto Sans KR ExtraBold" panose="020B0200000000000000" pitchFamily="50" charset="-127"/>
+                <a:ea typeface="Noto Sans KR ExtraBold" panose="020B0200000000000000" pitchFamily="50" charset="-127"/>
+              </a:rPr>
+              <a:t>      - </a:t>
+            </a:r>
+            <a:r>
+              <a:rPr lang="ko-KR" altLang="en-US" sz="5000" dirty="0">
+                <a:latin typeface="Noto Sans KR ExtraBold" panose="020B0200000000000000" pitchFamily="50" charset="-127"/>
+                <a:ea typeface="Noto Sans KR ExtraBold" panose="020B0200000000000000" pitchFamily="50" charset="-127"/>
+              </a:rPr>
+              <a:t>인스턴스 생성</a:t>
+            </a:r>
+            <a:endParaRPr lang="en-US" altLang="ko-KR" sz="5000" dirty="0">
+              <a:latin typeface="Noto Sans KR ExtraBold" panose="020B0200000000000000" pitchFamily="50" charset="-127"/>
+              <a:ea typeface="Noto Sans KR ExtraBold" panose="020B0200000000000000" pitchFamily="50" charset="-127"/>
+            </a:endParaRPr>
+          </a:p>
+          <a:p>
+            <a:pPr>
+              <a:lnSpc>
+                <a:spcPct val="150000"/>
+              </a:lnSpc>
+            </a:pPr>
+            <a:r>
+              <a:rPr lang="en-US" altLang="ko-KR" sz="5000" dirty="0">
+                <a:latin typeface="Noto Sans KR ExtraBold" panose="020B0200000000000000" pitchFamily="50" charset="-127"/>
+                <a:ea typeface="Noto Sans KR ExtraBold" panose="020B0200000000000000" pitchFamily="50" charset="-127"/>
+              </a:rPr>
+              <a:t>      - </a:t>
+            </a:r>
+            <a:r>
+              <a:rPr lang="ko-KR" altLang="en-US" sz="5000" dirty="0">
+                <a:latin typeface="Noto Sans KR ExtraBold" panose="020B0200000000000000" pitchFamily="50" charset="-127"/>
+                <a:ea typeface="Noto Sans KR ExtraBold" panose="020B0200000000000000" pitchFamily="50" charset="-127"/>
+              </a:rPr>
+              <a:t>필수 패키지 설치</a:t>
+            </a:r>
+            <a:r>
+              <a:rPr lang="en-US" altLang="ko-KR" sz="5000" dirty="0">
+                <a:latin typeface="Noto Sans KR ExtraBold" panose="020B0200000000000000" pitchFamily="50" charset="-127"/>
+                <a:ea typeface="Noto Sans KR ExtraBold" panose="020B0200000000000000" pitchFamily="50" charset="-127"/>
+              </a:rPr>
+              <a:t>(</a:t>
+            </a:r>
+            <a:r>
+              <a:rPr lang="en-US" altLang="ko-KR" sz="5000" dirty="0">
+                <a:latin typeface="Roboto Condensed ExtraBold" panose="02000000000000000000" pitchFamily="2" charset="0"/>
+                <a:ea typeface="Roboto Condensed ExtraBold" panose="02000000000000000000" pitchFamily="2" charset="0"/>
+              </a:rPr>
+              <a:t>Java17,</a:t>
+            </a:r>
+          </a:p>
+          <a:p>
+            <a:pPr>
+              <a:lnSpc>
+                <a:spcPct val="150000"/>
+              </a:lnSpc>
+            </a:pPr>
+            <a:r>
+              <a:rPr lang="en-US" altLang="ko-KR" sz="5000" dirty="0">
+                <a:latin typeface="Noto Sans KR ExtraBold" panose="020B0200000000000000" pitchFamily="50" charset="-127"/>
+                <a:ea typeface="Noto Sans KR ExtraBold" panose="020B0200000000000000" pitchFamily="50" charset="-127"/>
+              </a:rPr>
+              <a:t>         </a:t>
+            </a:r>
+            <a:r>
+              <a:rPr lang="en-US" altLang="ko-KR" sz="5000" dirty="0">
+                <a:latin typeface="Roboto Condensed ExtraBold" panose="02000000000000000000" pitchFamily="2" charset="0"/>
+                <a:ea typeface="Roboto Condensed ExtraBold" panose="02000000000000000000" pitchFamily="2" charset="0"/>
+              </a:rPr>
+              <a:t>MySQL 8.0, Python 1.12, Nginx</a:t>
+            </a:r>
+            <a:r>
+              <a:rPr lang="en-US" altLang="ko-KR" sz="5000" dirty="0">
+                <a:latin typeface="Noto Sans KR ExtraBold" panose="020B0200000000000000" pitchFamily="50" charset="-127"/>
+                <a:ea typeface="Noto Sans KR ExtraBold" panose="020B0200000000000000" pitchFamily="50" charset="-127"/>
+              </a:rPr>
+              <a:t>)</a:t>
+            </a:r>
+          </a:p>
+        </p:txBody>
+      </p:sp>
+      <p:sp>
+        <p:nvSpPr>
+          <p:cNvPr id="32" name="TextBox 31">
+            <a:extLst>
+              <a:ext uri="{FF2B5EF4-FFF2-40B4-BE49-F238E27FC236}">
+                <a16:creationId xmlns:a16="http://schemas.microsoft.com/office/drawing/2014/main" id="{4947EB13-459C-4B8E-B95F-3FCA0BE22BB0}"/>
+              </a:ext>
+            </a:extLst>
+          </p:cNvPr>
+          <p:cNvSpPr txBox="1"/>
+          <p:nvPr/>
+        </p:nvSpPr>
+        <p:spPr>
+          <a:xfrm>
+            <a:off x="838200" y="2912202"/>
+            <a:ext cx="13506450" cy="1086195"/>
+          </a:xfrm>
+          <a:prstGeom prst="rect">
+            <a:avLst/>
+          </a:prstGeom>
+          <a:noFill/>
+        </p:spPr>
+        <p:txBody>
+          <a:bodyPr wrap="square">
+            <a:spAutoFit/>
+          </a:bodyPr>
+          <a:lstStyle/>
+          <a:p>
+            <a:pPr lvl="0" algn="l">
+              <a:lnSpc>
+                <a:spcPct val="116199"/>
+              </a:lnSpc>
+            </a:pPr>
+            <a:r>
+              <a:rPr lang="en-US" altLang="ko-KR" sz="6000" spc="-133" dirty="0">
+                <a:solidFill>
+                  <a:srgbClr val="197A52"/>
+                </a:solidFill>
+                <a:latin typeface="Roboto Condensed ExtraBold" panose="02000000000000000000" pitchFamily="2" charset="0"/>
+                <a:ea typeface="Roboto Condensed ExtraBold" panose="02000000000000000000" pitchFamily="2" charset="0"/>
+              </a:rPr>
+              <a:t>6. AWS </a:t>
+            </a:r>
+            <a:r>
+              <a:rPr lang="en-US" altLang="ko-KR" sz="6000" spc="-133" dirty="0" err="1">
+                <a:solidFill>
+                  <a:srgbClr val="197A52"/>
+                </a:solidFill>
+                <a:latin typeface="Roboto Condensed ExtraBold" panose="02000000000000000000" pitchFamily="2" charset="0"/>
+                <a:ea typeface="Roboto Condensed ExtraBold" panose="02000000000000000000" pitchFamily="2" charset="0"/>
+              </a:rPr>
+              <a:t>Lightsail</a:t>
+            </a:r>
+            <a:r>
+              <a:rPr lang="en-US" altLang="ko-KR" sz="6000" spc="-133" dirty="0">
+                <a:solidFill>
+                  <a:srgbClr val="197A52"/>
+                </a:solidFill>
+                <a:latin typeface="Roboto Condensed ExtraBold" panose="02000000000000000000" pitchFamily="2" charset="0"/>
+                <a:ea typeface="Roboto Condensed ExtraBold" panose="02000000000000000000" pitchFamily="2" charset="0"/>
+              </a:rPr>
+              <a:t> </a:t>
+            </a:r>
+            <a:r>
+              <a:rPr lang="ko-KR" altLang="en-US" sz="6000" spc="-133" dirty="0">
+                <a:solidFill>
+                  <a:srgbClr val="197A52"/>
+                </a:solidFill>
+                <a:latin typeface="Noto Sans KR ExtraBold" panose="020B0200000000000000" pitchFamily="50" charset="-127"/>
+                <a:ea typeface="Noto Sans KR ExtraBold" panose="020B0200000000000000" pitchFamily="50" charset="-127"/>
+              </a:rPr>
+              <a:t>웹 배포 작업</a:t>
+            </a:r>
+            <a:endParaRPr lang="ko-KR" altLang="ko-KR" sz="6000" b="0" i="0" u="none" strike="noStrike" spc="-133" dirty="0">
+              <a:solidFill>
+                <a:srgbClr val="197A52"/>
+              </a:solidFill>
+              <a:latin typeface="Noto Sans KR ExtraBold" panose="020B0200000000000000" pitchFamily="50" charset="-127"/>
+              <a:ea typeface="Noto Sans KR ExtraBold" panose="020B0200000000000000" pitchFamily="50" charset="-127"/>
+            </a:endParaRPr>
+          </a:p>
+        </p:txBody>
+      </p:sp>
+      <p:pic>
+        <p:nvPicPr>
+          <p:cNvPr id="3" name="그림 2">
+            <a:extLst>
+              <a:ext uri="{FF2B5EF4-FFF2-40B4-BE49-F238E27FC236}">
+                <a16:creationId xmlns:a16="http://schemas.microsoft.com/office/drawing/2014/main" id="{7D2F638E-CA5E-449B-A392-678DDBC4922C}"/>
+              </a:ext>
+            </a:extLst>
+          </p:cNvPr>
+          <p:cNvPicPr>
+            <a:picLocks noChangeAspect="1"/>
+          </p:cNvPicPr>
+          <p:nvPr/>
+        </p:nvPicPr>
+        <p:blipFill>
+          <a:blip r:embed="rId2">
+            <a:extLst>
+              <a:ext uri="{28A0092B-C50C-407E-A947-70E740481C1C}">
+                <a14:useLocalDpi xmlns:a14="http://schemas.microsoft.com/office/drawing/2010/main" val="0"/>
+              </a:ext>
+            </a:extLst>
+          </a:blip>
+          <a:stretch>
+            <a:fillRect/>
+          </a:stretch>
+        </p:blipFill>
+        <p:spPr>
+          <a:xfrm>
+            <a:off x="10950951" y="1310218"/>
+            <a:ext cx="12612860" cy="11498196"/>
+          </a:xfrm>
+          <a:prstGeom prst="rect">
+            <a:avLst/>
+          </a:prstGeom>
+          <a:ln>
+            <a:solidFill>
+              <a:schemeClr val="tx1"/>
+            </a:solidFill>
+          </a:ln>
+        </p:spPr>
+      </p:pic>
+      <p:sp>
+        <p:nvSpPr>
+          <p:cNvPr id="8" name="TextBox 7">
+            <a:extLst>
+              <a:ext uri="{FF2B5EF4-FFF2-40B4-BE49-F238E27FC236}">
+                <a16:creationId xmlns:a16="http://schemas.microsoft.com/office/drawing/2014/main" id="{0AD65385-1F5A-4738-816E-457751682739}"/>
+              </a:ext>
+            </a:extLst>
+          </p:cNvPr>
+          <p:cNvSpPr txBox="1"/>
+          <p:nvPr/>
+        </p:nvSpPr>
+        <p:spPr>
+          <a:xfrm>
+            <a:off x="537487" y="9593320"/>
+            <a:ext cx="10414002" cy="3419334"/>
+          </a:xfrm>
+          <a:prstGeom prst="rect">
+            <a:avLst/>
+          </a:prstGeom>
+          <a:noFill/>
+        </p:spPr>
+        <p:txBody>
+          <a:bodyPr wrap="square" rtlCol="0">
+            <a:spAutoFit/>
+          </a:bodyPr>
+          <a:lstStyle/>
+          <a:p>
+            <a:pPr>
+              <a:lnSpc>
+                <a:spcPct val="150000"/>
+              </a:lnSpc>
+            </a:pPr>
+            <a:r>
+              <a:rPr lang="en-US" altLang="ko-KR" sz="5000" dirty="0">
+                <a:latin typeface="Noto Sans KR ExtraBold" panose="020B0200000000000000" pitchFamily="50" charset="-127"/>
+                <a:ea typeface="Noto Sans KR ExtraBold" panose="020B0200000000000000" pitchFamily="50" charset="-127"/>
+              </a:rPr>
+              <a:t>2) </a:t>
+            </a:r>
+            <a:r>
+              <a:rPr lang="ko-KR" altLang="en-US" sz="5000" dirty="0">
+                <a:latin typeface="Noto Sans KR ExtraBold" panose="020B0200000000000000" pitchFamily="50" charset="-127"/>
+                <a:ea typeface="Noto Sans KR ExtraBold" panose="020B0200000000000000" pitchFamily="50" charset="-127"/>
+              </a:rPr>
+              <a:t>도메인 </a:t>
+            </a:r>
+            <a:r>
+              <a:rPr lang="en-US" altLang="ko-KR" sz="5000" dirty="0">
+                <a:latin typeface="Noto Sans KR ExtraBold" panose="020B0200000000000000" pitchFamily="50" charset="-127"/>
+                <a:ea typeface="Noto Sans KR ExtraBold" panose="020B0200000000000000" pitchFamily="50" charset="-127"/>
+              </a:rPr>
+              <a:t>&amp; </a:t>
+            </a:r>
+            <a:r>
+              <a:rPr lang="ko-KR" altLang="en-US" sz="5000" dirty="0">
+                <a:latin typeface="Noto Sans KR ExtraBold" panose="020B0200000000000000" pitchFamily="50" charset="-127"/>
+                <a:ea typeface="Noto Sans KR ExtraBold" panose="020B0200000000000000" pitchFamily="50" charset="-127"/>
+              </a:rPr>
+              <a:t>보안 설정</a:t>
+            </a:r>
+            <a:endParaRPr lang="en-US" altLang="ko-KR" sz="5000" dirty="0">
+              <a:latin typeface="Noto Sans KR ExtraBold" panose="020B0200000000000000" pitchFamily="50" charset="-127"/>
+              <a:ea typeface="Noto Sans KR ExtraBold" panose="020B0200000000000000" pitchFamily="50" charset="-127"/>
+            </a:endParaRPr>
+          </a:p>
+          <a:p>
+            <a:pPr>
+              <a:lnSpc>
+                <a:spcPct val="150000"/>
+              </a:lnSpc>
+            </a:pPr>
+            <a:r>
+              <a:rPr lang="en-US" altLang="ko-KR" sz="5000" dirty="0">
+                <a:latin typeface="Noto Sans KR ExtraBold" panose="020B0200000000000000" pitchFamily="50" charset="-127"/>
+                <a:ea typeface="Noto Sans KR ExtraBold" panose="020B0200000000000000" pitchFamily="50" charset="-127"/>
+              </a:rPr>
+              <a:t>    - </a:t>
+            </a:r>
+            <a:r>
+              <a:rPr lang="en-US" altLang="ko-KR" sz="5000" dirty="0" err="1">
+                <a:latin typeface="Roboto Condensed ExtraBold" panose="02000000000000000000" pitchFamily="2" charset="0"/>
+                <a:ea typeface="Roboto Condensed ExtraBold" panose="02000000000000000000" pitchFamily="2" charset="0"/>
+              </a:rPr>
+              <a:t>DuckDNS</a:t>
+            </a:r>
+            <a:r>
+              <a:rPr lang="en-US" altLang="ko-KR" sz="5000" dirty="0">
+                <a:latin typeface="Noto Sans KR ExtraBold" panose="020B0200000000000000" pitchFamily="50" charset="-127"/>
+                <a:ea typeface="Noto Sans KR ExtraBold" panose="020B0200000000000000" pitchFamily="50" charset="-127"/>
+              </a:rPr>
+              <a:t> </a:t>
+            </a:r>
+            <a:r>
+              <a:rPr lang="ko-KR" altLang="en-US" sz="5000" dirty="0">
+                <a:latin typeface="Noto Sans KR ExtraBold" panose="020B0200000000000000" pitchFamily="50" charset="-127"/>
+                <a:ea typeface="Noto Sans KR ExtraBold" panose="020B0200000000000000" pitchFamily="50" charset="-127"/>
+              </a:rPr>
+              <a:t>무료 도메인 연결</a:t>
+            </a:r>
+            <a:endParaRPr lang="en-US" altLang="ko-KR" sz="5000" dirty="0">
+              <a:latin typeface="Noto Sans KR ExtraBold" panose="020B0200000000000000" pitchFamily="50" charset="-127"/>
+              <a:ea typeface="Noto Sans KR ExtraBold" panose="020B0200000000000000" pitchFamily="50" charset="-127"/>
+            </a:endParaRPr>
+          </a:p>
+          <a:p>
+            <a:pPr>
+              <a:lnSpc>
+                <a:spcPct val="150000"/>
+              </a:lnSpc>
+            </a:pPr>
+            <a:r>
+              <a:rPr lang="en-US" altLang="ko-KR" sz="5000" dirty="0">
+                <a:latin typeface="Noto Sans KR ExtraBold" panose="020B0200000000000000" pitchFamily="50" charset="-127"/>
+                <a:ea typeface="Noto Sans KR ExtraBold" panose="020B0200000000000000" pitchFamily="50" charset="-127"/>
+              </a:rPr>
+              <a:t>    - </a:t>
+            </a:r>
+            <a:r>
+              <a:rPr lang="en-US" altLang="ko-KR" sz="5000" dirty="0">
+                <a:solidFill>
+                  <a:srgbClr val="FF0000"/>
+                </a:solidFill>
+                <a:latin typeface="Roboto Condensed ExtraBold" panose="02000000000000000000" pitchFamily="2" charset="0"/>
+                <a:ea typeface="Roboto Condensed ExtraBold" panose="02000000000000000000" pitchFamily="2" charset="0"/>
+              </a:rPr>
+              <a:t>HTTPS</a:t>
+            </a:r>
+            <a:r>
+              <a:rPr lang="en-US" altLang="ko-KR" sz="5000" dirty="0">
+                <a:solidFill>
+                  <a:srgbClr val="FF0000"/>
+                </a:solidFill>
+                <a:latin typeface="Noto Sans KR ExtraBold" panose="020B0200000000000000" pitchFamily="50" charset="-127"/>
+                <a:ea typeface="Noto Sans KR ExtraBold" panose="020B0200000000000000" pitchFamily="50" charset="-127"/>
+              </a:rPr>
+              <a:t> </a:t>
+            </a:r>
+            <a:r>
+              <a:rPr lang="ko-KR" altLang="en-US" sz="5000" dirty="0">
+                <a:solidFill>
+                  <a:srgbClr val="FF0000"/>
+                </a:solidFill>
+                <a:latin typeface="Noto Sans KR ExtraBold" panose="020B0200000000000000" pitchFamily="50" charset="-127"/>
+                <a:ea typeface="Noto Sans KR ExtraBold" panose="020B0200000000000000" pitchFamily="50" charset="-127"/>
+              </a:rPr>
+              <a:t>적용</a:t>
+            </a:r>
+            <a:r>
+              <a:rPr lang="en-US" altLang="ko-KR" sz="5000" dirty="0">
+                <a:latin typeface="Noto Sans KR ExtraBold" panose="020B0200000000000000" pitchFamily="50" charset="-127"/>
+                <a:ea typeface="Noto Sans KR ExtraBold" panose="020B0200000000000000" pitchFamily="50" charset="-127"/>
+              </a:rPr>
+              <a:t>(</a:t>
+            </a:r>
+            <a:r>
+              <a:rPr lang="en-US" altLang="ko-KR" sz="5000" dirty="0">
+                <a:latin typeface="Roboto Condensed ExtraBold" panose="02000000000000000000" pitchFamily="2" charset="0"/>
+                <a:ea typeface="Roboto Condensed ExtraBold" panose="02000000000000000000" pitchFamily="2" charset="0"/>
+              </a:rPr>
+              <a:t>SSL</a:t>
+            </a:r>
+            <a:r>
+              <a:rPr lang="en-US" altLang="ko-KR" sz="5000" dirty="0">
+                <a:latin typeface="Noto Sans KR ExtraBold" panose="020B0200000000000000" pitchFamily="50" charset="-127"/>
+                <a:ea typeface="Noto Sans KR ExtraBold" panose="020B0200000000000000" pitchFamily="50" charset="-127"/>
+              </a:rPr>
+              <a:t> </a:t>
+            </a:r>
+            <a:r>
+              <a:rPr lang="ko-KR" altLang="en-US" sz="5000" dirty="0">
+                <a:latin typeface="Noto Sans KR ExtraBold" panose="020B0200000000000000" pitchFamily="50" charset="-127"/>
+                <a:ea typeface="Noto Sans KR ExtraBold" panose="020B0200000000000000" pitchFamily="50" charset="-127"/>
+              </a:rPr>
+              <a:t>인증서 적용</a:t>
+            </a:r>
+            <a:r>
+              <a:rPr lang="en-US" altLang="ko-KR" sz="5000" dirty="0">
+                <a:latin typeface="Noto Sans KR ExtraBold" panose="020B0200000000000000" pitchFamily="50" charset="-127"/>
+                <a:ea typeface="Noto Sans KR ExtraBold" panose="020B0200000000000000" pitchFamily="50" charset="-127"/>
+              </a:rPr>
+              <a:t>)</a:t>
+            </a:r>
+          </a:p>
+        </p:txBody>
+      </p:sp>
+    </p:spTree>
+    <p:extLst>
+      <p:ext uri="{BB962C8B-B14F-4D97-AF65-F5344CB8AC3E}">
+        <p14:creationId xmlns:p14="http://schemas.microsoft.com/office/powerpoint/2010/main" val="2395350739"/>
+      </p:ext>
+    </p:extLst>
+  </p:cSld>
+  <p:clrMapOvr>
+    <a:masterClrMapping/>
+  </p:clrMapOvr>
+</p:sld>
+</file>
+
+<file path=ppt/slides/slide21.xml><?xml version="1.0" encoding="utf-8"?>
+<p:sld xmlns:a="http://schemas.openxmlformats.org/drawingml/2006/main" xmlns:r="http://schemas.openxmlformats.org/officeDocument/2006/relationships" xmlns:p="http://schemas.openxmlformats.org/presentationml/2006/main">
+  <p:cSld>
     <p:bg>
       <p:bgPr>
         <a:solidFill>
@@ -15344,6 +15965,55 @@
           </a:p>
         </p:txBody>
       </p:sp>
+      <p:sp>
+        <p:nvSpPr>
+          <p:cNvPr id="2" name="TextBox 1">
+            <a:extLst>
+              <a:ext uri="{FF2B5EF4-FFF2-40B4-BE49-F238E27FC236}">
+                <a16:creationId xmlns:a16="http://schemas.microsoft.com/office/drawing/2014/main" id="{2401924D-E89D-4CF9-B832-F1A50B36CD7E}"/>
+              </a:ext>
+            </a:extLst>
+          </p:cNvPr>
+          <p:cNvSpPr txBox="1"/>
+          <p:nvPr/>
+        </p:nvSpPr>
+        <p:spPr>
+          <a:xfrm>
+            <a:off x="7239000" y="9067800"/>
+            <a:ext cx="11811000" cy="861774"/>
+          </a:xfrm>
+          <a:prstGeom prst="rect">
+            <a:avLst/>
+          </a:prstGeom>
+          <a:noFill/>
+        </p:spPr>
+        <p:txBody>
+          <a:bodyPr wrap="square" rtlCol="0">
+            <a:spAutoFit/>
+          </a:bodyPr>
+          <a:lstStyle/>
+          <a:p>
+            <a:r>
+              <a:rPr lang="en-US" altLang="ko-KR" sz="5000" dirty="0">
+                <a:latin typeface="Roboto Condensed ExtraBold" panose="02000000000000000000" pitchFamily="2" charset="0"/>
+                <a:ea typeface="Roboto Condensed ExtraBold" panose="02000000000000000000" pitchFamily="2" charset="0"/>
+                <a:hlinkClick r:id="rId2"/>
+              </a:rPr>
+              <a:t>https://brain-hemorrhage.duckdns.org</a:t>
+            </a:r>
+            <a:r>
+              <a:rPr lang="en-US" altLang="ko-KR" sz="5000" dirty="0">
+                <a:latin typeface="Roboto Condensed ExtraBold" panose="02000000000000000000" pitchFamily="2" charset="0"/>
+                <a:ea typeface="Roboto Condensed ExtraBold" panose="02000000000000000000" pitchFamily="2" charset="0"/>
+              </a:rPr>
+              <a:t> </a:t>
+            </a:r>
+            <a:endParaRPr lang="ko-KR" altLang="en-US" sz="5000" dirty="0">
+              <a:latin typeface="Roboto Condensed ExtraBold" panose="02000000000000000000" pitchFamily="2" charset="0"/>
+            </a:endParaRPr>
+          </a:p>
+        </p:txBody>
+      </p:sp>
     </p:spTree>
     <p:extLst>
       <p:ext uri="{BB962C8B-B14F-4D97-AF65-F5344CB8AC3E}">
@@ -15357,7 +16027,7 @@
 </p:sld>
 </file>
 
-<file path=ppt/slides/slide21.xml><?xml version="1.0" encoding="utf-8"?>
+<file path=ppt/slides/slide22.xml><?xml version="1.0" encoding="utf-8"?>
 <p:sld xmlns:a="http://schemas.openxmlformats.org/drawingml/2006/main" xmlns:r="http://schemas.openxmlformats.org/officeDocument/2006/relationships" xmlns:p="http://schemas.openxmlformats.org/presentationml/2006/main">
   <p:cSld>
     <p:spTree>
@@ -15538,7 +16208,7 @@
         </p:nvSpPr>
         <p:spPr>
           <a:xfrm>
-            <a:off x="1676400" y="4810132"/>
+            <a:off x="1676400" y="4643992"/>
             <a:ext cx="15792450" cy="2047868"/>
           </a:xfrm>
           <a:prstGeom prst="rect">
@@ -15648,7 +16318,7 @@
         </p:nvSpPr>
         <p:spPr>
           <a:xfrm>
-            <a:off x="1654277" y="7431552"/>
+            <a:off x="1654277" y="7265412"/>
             <a:ext cx="14728723" cy="2047868"/>
           </a:xfrm>
           <a:prstGeom prst="rect">
@@ -15672,7 +16342,21 @@
                 <a:latin typeface="Noto Sans KR ExtraBold" panose="020B0200000000000000" pitchFamily="50" charset="-127"/>
                 <a:ea typeface="Noto Sans KR ExtraBold" panose="020B0200000000000000" pitchFamily="50" charset="-127"/>
               </a:rPr>
-              <a:t>2) Grad-CAM </a:t>
+              <a:t>2) </a:t>
+            </a:r>
+            <a:r>
+              <a:rPr lang="en-US" altLang="ko-KR" sz="4500" dirty="0">
+                <a:latin typeface="Roboto Condensed ExtraBold" panose="02000000000000000000" pitchFamily="2" charset="0"/>
+                <a:ea typeface="Roboto Condensed ExtraBold" panose="02000000000000000000" pitchFamily="2" charset="0"/>
+              </a:rPr>
+              <a:t>Grad-CAM</a:t>
+            </a:r>
+            <a:r>
+              <a:rPr lang="en-US" altLang="ko-KR" sz="4500" dirty="0">
+                <a:latin typeface="Noto Sans KR ExtraBold" panose="020B0200000000000000" pitchFamily="50" charset="-127"/>
+                <a:ea typeface="Noto Sans KR ExtraBold" panose="020B0200000000000000" pitchFamily="50" charset="-127"/>
+              </a:rPr>
+              <a:t> </a:t>
             </a:r>
             <a:r>
               <a:rPr lang="ko-KR" altLang="en-US" sz="4500" dirty="0" err="1">
@@ -15747,8 +16431,8 @@
         </p:nvSpPr>
         <p:spPr>
           <a:xfrm>
-            <a:off x="1649022" y="10052972"/>
-            <a:ext cx="15038778" cy="2047868"/>
+            <a:off x="1649022" y="9886832"/>
+            <a:ext cx="15038778" cy="3086614"/>
           </a:xfrm>
           <a:prstGeom prst="rect">
             <a:avLst/>
@@ -15778,12 +16462,50 @@
                 <a:latin typeface="Noto Sans KR ExtraBold" panose="020B0200000000000000" pitchFamily="50" charset="-127"/>
                 <a:ea typeface="Noto Sans KR ExtraBold" panose="020B0200000000000000" pitchFamily="50" charset="-127"/>
               </a:rPr>
-              <a:t>개발한 모델을 활용하여 전문의 보조 시스템을 구축할 수  </a:t>
-            </a:r>
-            <a:endParaRPr lang="en-US" altLang="ko-KR" sz="4500" dirty="0">
-              <a:latin typeface="Noto Sans KR ExtraBold" panose="020B0200000000000000" pitchFamily="50" charset="-127"/>
-              <a:ea typeface="Noto Sans KR ExtraBold" panose="020B0200000000000000" pitchFamily="50" charset="-127"/>
-            </a:endParaRPr>
+              <a:t>데이터 수집부터 모델 개발</a:t>
+            </a:r>
+            <a:r>
+              <a:rPr lang="en-US" altLang="ko-KR" sz="4500" dirty="0">
+                <a:latin typeface="Noto Sans KR ExtraBold" panose="020B0200000000000000" pitchFamily="50" charset="-127"/>
+                <a:ea typeface="Noto Sans KR ExtraBold" panose="020B0200000000000000" pitchFamily="50" charset="-127"/>
+              </a:rPr>
+              <a:t>, </a:t>
+            </a:r>
+            <a:r>
+              <a:rPr lang="ko-KR" altLang="en-US" sz="4500" dirty="0" err="1">
+                <a:latin typeface="Noto Sans KR ExtraBold" panose="020B0200000000000000" pitchFamily="50" charset="-127"/>
+                <a:ea typeface="Noto Sans KR ExtraBold" panose="020B0200000000000000" pitchFamily="50" charset="-127"/>
+              </a:rPr>
+              <a:t>백엔드</a:t>
+            </a:r>
+            <a:r>
+              <a:rPr lang="en-US" altLang="ko-KR" sz="4500" dirty="0">
+                <a:latin typeface="Noto Sans KR ExtraBold" panose="020B0200000000000000" pitchFamily="50" charset="-127"/>
+                <a:ea typeface="Noto Sans KR ExtraBold" panose="020B0200000000000000" pitchFamily="50" charset="-127"/>
+              </a:rPr>
+              <a:t>/</a:t>
+            </a:r>
+            <a:r>
+              <a:rPr lang="ko-KR" altLang="en-US" sz="4500" dirty="0" err="1">
+                <a:latin typeface="Noto Sans KR ExtraBold" panose="020B0200000000000000" pitchFamily="50" charset="-127"/>
+                <a:ea typeface="Noto Sans KR ExtraBold" panose="020B0200000000000000" pitchFamily="50" charset="-127"/>
+              </a:rPr>
+              <a:t>프론트엔드</a:t>
+            </a:r>
+            <a:r>
+              <a:rPr lang="ko-KR" altLang="en-US" sz="4500" dirty="0">
+                <a:latin typeface="Noto Sans KR ExtraBold" panose="020B0200000000000000" pitchFamily="50" charset="-127"/>
+                <a:ea typeface="Noto Sans KR ExtraBold" panose="020B0200000000000000" pitchFamily="50" charset="-127"/>
+              </a:rPr>
+              <a:t> 구축</a:t>
+            </a:r>
+            <a:r>
+              <a:rPr lang="en-US" altLang="ko-KR" sz="4500" dirty="0">
+                <a:latin typeface="Noto Sans KR ExtraBold" panose="020B0200000000000000" pitchFamily="50" charset="-127"/>
+                <a:ea typeface="Noto Sans KR ExtraBold" panose="020B0200000000000000" pitchFamily="50" charset="-127"/>
+              </a:rPr>
+              <a:t>, </a:t>
+            </a:r>
           </a:p>
           <a:p>
             <a:pPr>
@@ -15803,10 +16525,17 @@
                 <a:latin typeface="Noto Sans KR ExtraBold" panose="020B0200000000000000" pitchFamily="50" charset="-127"/>
                 <a:ea typeface="Noto Sans KR ExtraBold" panose="020B0200000000000000" pitchFamily="50" charset="-127"/>
               </a:rPr>
-              <a:t>있는</a:t>
+              <a:t>클라우드 배포까지 </a:t>
             </a:r>
             <a:r>
               <a:rPr lang="en-US" altLang="ko-KR" sz="4500" dirty="0">
+                <a:latin typeface="Roboto Condensed ExtraBold" panose="02000000000000000000" pitchFamily="2" charset="0"/>
+                <a:ea typeface="Roboto Condensed ExtraBold" panose="02000000000000000000" pitchFamily="2" charset="0"/>
+              </a:rPr>
+              <a:t>End-to-End</a:t>
+            </a:r>
+            <a:r>
+              <a:rPr lang="en-US" altLang="ko-KR" sz="4500" dirty="0">
                 <a:latin typeface="Noto Sans KR ExtraBold" panose="020B0200000000000000" pitchFamily="50" charset="-127"/>
                 <a:ea typeface="Noto Sans KR ExtraBold" panose="020B0200000000000000" pitchFamily="50" charset="-127"/>
               </a:rPr>
@@ -15817,28 +16546,25 @@
                 <a:latin typeface="Noto Sans KR ExtraBold" panose="020B0200000000000000" pitchFamily="50" charset="-127"/>
                 <a:ea typeface="Noto Sans KR ExtraBold" panose="020B0200000000000000" pitchFamily="50" charset="-127"/>
               </a:rPr>
-              <a:t>기반을 마련하였다</a:t>
-            </a:r>
+              <a:t>서비스 개발을 경험 </a:t>
+            </a:r>
+            <a:endParaRPr lang="en-US" altLang="ko-KR" sz="4500" dirty="0">
+              <a:latin typeface="Noto Sans KR ExtraBold" panose="020B0200000000000000" pitchFamily="50" charset="-127"/>
+              <a:ea typeface="Noto Sans KR ExtraBold" panose="020B0200000000000000" pitchFamily="50" charset="-127"/>
+            </a:endParaRPr>
+          </a:p>
+          <a:p>
+            <a:pPr>
+              <a:lnSpc>
+                <a:spcPct val="150000"/>
+              </a:lnSpc>
+            </a:pPr>
             <a:r>
               <a:rPr lang="en-US" altLang="ko-KR" sz="4500" dirty="0">
                 <a:latin typeface="Noto Sans KR ExtraBold" panose="020B0200000000000000" pitchFamily="50" charset="-127"/>
                 <a:ea typeface="Noto Sans KR ExtraBold" panose="020B0200000000000000" pitchFamily="50" charset="-127"/>
               </a:rPr>
-              <a:t>.</a:t>
-            </a:r>
-            <a:r>
-              <a:rPr lang="ko-KR" altLang="en-US" sz="4500" dirty="0">
-                <a:latin typeface="Noto Sans KR ExtraBold" panose="020B0200000000000000" pitchFamily="50" charset="-127"/>
-                <a:ea typeface="Noto Sans KR ExtraBold" panose="020B0200000000000000" pitchFamily="50" charset="-127"/>
-              </a:rPr>
-              <a:t> </a:t>
-            </a:r>
-            <a:r>
-              <a:rPr lang="en-US" altLang="ko-KR" sz="4500" dirty="0">
-                <a:latin typeface="Noto Sans KR ExtraBold" panose="020B0200000000000000" pitchFamily="50" charset="-127"/>
-                <a:ea typeface="Noto Sans KR ExtraBold" panose="020B0200000000000000" pitchFamily="50" charset="-127"/>
-              </a:rPr>
-              <a:t>→ </a:t>
+              <a:t>       → </a:t>
             </a:r>
             <a:r>
               <a:rPr lang="ko-KR" altLang="en-US" sz="4500" dirty="0">
@@ -15848,15 +16574,18 @@
                 <a:latin typeface="Noto Sans KR ExtraBold" panose="020B0200000000000000" pitchFamily="50" charset="-127"/>
                 <a:ea typeface="Noto Sans KR ExtraBold" panose="020B0200000000000000" pitchFamily="50" charset="-127"/>
               </a:rPr>
-              <a:t>전문의 인력 부족 문제 해소</a:t>
-            </a:r>
-            <a:endParaRPr lang="en-US" altLang="ko-KR" sz="4500" dirty="0">
-              <a:solidFill>
-                <a:srgbClr val="FF0000"/>
-              </a:solidFill>
-              <a:latin typeface="Noto Sans KR ExtraBold" panose="020B0200000000000000" pitchFamily="50" charset="-127"/>
-              <a:ea typeface="Noto Sans KR ExtraBold" panose="020B0200000000000000" pitchFamily="50" charset="-127"/>
-            </a:endParaRPr>
+              <a:t>실무 역량을 강화하였다</a:t>
+            </a:r>
+            <a:r>
+              <a:rPr lang="en-US" altLang="ko-KR" sz="4500" dirty="0">
+                <a:solidFill>
+                  <a:srgbClr val="FF0000"/>
+                </a:solidFill>
+                <a:latin typeface="Noto Sans KR ExtraBold" panose="020B0200000000000000" pitchFamily="50" charset="-127"/>
+                <a:ea typeface="Noto Sans KR ExtraBold" panose="020B0200000000000000" pitchFamily="50" charset="-127"/>
+              </a:rPr>
+              <a:t>.</a:t>
+            </a:r>
           </a:p>
         </p:txBody>
       </p:sp>
@@ -15873,7 +16602,7 @@
 </p:sld>
 </file>
 
-<file path=ppt/slides/slide22.xml><?xml version="1.0" encoding="utf-8"?>
+<file path=ppt/slides/slide23.xml><?xml version="1.0" encoding="utf-8"?>
 <p:sld xmlns:a="http://schemas.openxmlformats.org/drawingml/2006/main" xmlns:r="http://schemas.openxmlformats.org/officeDocument/2006/relationships" xmlns:p="http://schemas.openxmlformats.org/presentationml/2006/main">
   <p:cSld>
     <p:spTree>
@@ -15922,7 +16651,7 @@
         </p:nvSpPr>
         <p:spPr>
           <a:xfrm>
-            <a:off x="606600" y="3827273"/>
+            <a:off x="606600" y="4880117"/>
             <a:ext cx="9375600" cy="3955766"/>
           </a:xfrm>
           <a:prstGeom prst="rect">
@@ -16189,7 +16918,7 @@
         </p:nvSpPr>
         <p:spPr>
           <a:xfrm>
-            <a:off x="10791999" y="4149815"/>
+            <a:off x="10791999" y="5377045"/>
             <a:ext cx="10923971" cy="2961910"/>
           </a:xfrm>
           <a:prstGeom prst="rect">
@@ -16260,8 +16989,8 @@
             </a:r>
             <a:r>
               <a:rPr lang="en-US" altLang="ko-KR" sz="4500" spc="-153" dirty="0">
-                <a:latin typeface="Noto Sans KR ExtraBold" panose="020B0200000000000000" pitchFamily="50" charset="-127"/>
-                <a:ea typeface="Noto Sans KR ExtraBold" panose="020B0200000000000000" pitchFamily="50" charset="-127"/>
+                <a:latin typeface="Roboto Condensed ExtraBold" panose="02000000000000000000" pitchFamily="2" charset="0"/>
+                <a:ea typeface="Roboto Condensed ExtraBold" panose="02000000000000000000" pitchFamily="2" charset="0"/>
               </a:rPr>
               <a:t>CT</a:t>
             </a:r>
@@ -16324,7 +17053,7 @@
         </p:nvSpPr>
         <p:spPr>
           <a:xfrm>
-            <a:off x="606599" y="7705201"/>
+            <a:off x="606599" y="9067800"/>
             <a:ext cx="9775435" cy="2558621"/>
           </a:xfrm>
           <a:prstGeom prst="rect">
@@ -16391,19 +17120,26 @@
                 <a:latin typeface="Noto Sans KR ExtraBold" panose="020B0200000000000000" pitchFamily="50" charset="-127"/>
                 <a:ea typeface="Noto Sans KR ExtraBold" panose="020B0200000000000000" pitchFamily="50" charset="-127"/>
               </a:rPr>
-              <a:t>: JPG,</a:t>
+              <a:t>: </a:t>
+            </a:r>
+            <a:r>
+              <a:rPr lang="en-US" altLang="ko-KR" sz="4500" spc="-153" dirty="0">
+                <a:latin typeface="Roboto Condensed ExtraBold" panose="02000000000000000000" pitchFamily="2" charset="0"/>
+                <a:ea typeface="Roboto Condensed ExtraBold" panose="02000000000000000000" pitchFamily="2" charset="0"/>
+              </a:rPr>
+              <a:t>JPG,</a:t>
             </a:r>
             <a:r>
               <a:rPr lang="ko-KR" altLang="en-US" sz="4500" spc="-153" dirty="0">
-                <a:latin typeface="Noto Sans KR ExtraBold" panose="020B0200000000000000" pitchFamily="50" charset="-127"/>
+                <a:latin typeface="Roboto Condensed ExtraBold" panose="02000000000000000000" pitchFamily="2" charset="0"/>
                 <a:ea typeface="Noto Sans KR ExtraBold" panose="020B0200000000000000" pitchFamily="50" charset="-127"/>
               </a:rPr>
               <a:t> </a:t>
             </a:r>
             <a:r>
               <a:rPr lang="en-US" altLang="ko-KR" sz="4500" spc="-153" dirty="0">
-                <a:latin typeface="Noto Sans KR ExtraBold" panose="020B0200000000000000" pitchFamily="50" charset="-127"/>
-                <a:ea typeface="Noto Sans KR ExtraBold" panose="020B0200000000000000" pitchFamily="50" charset="-127"/>
+                <a:latin typeface="Roboto Condensed ExtraBold" panose="02000000000000000000" pitchFamily="2" charset="0"/>
+                <a:ea typeface="Roboto Condensed ExtraBold" panose="02000000000000000000" pitchFamily="2" charset="0"/>
               </a:rPr>
               <a:t>PNG, JPEG</a:t>
             </a:r>
@@ -16413,102 +17149,6 @@
                 <a:ea typeface="Noto Sans KR ExtraBold" panose="020B0200000000000000" pitchFamily="50" charset="-127"/>
               </a:rPr>
               <a:t>만 가능</a:t>
-            </a:r>
-            <a:endParaRPr lang="en-US" altLang="ko-KR" sz="4500" b="0" i="0" u="none" strike="noStrike" spc="-153" dirty="0">
-              <a:latin typeface="Noto Sans KR ExtraBold" panose="020B0200000000000000" pitchFamily="50" charset="-127"/>
-              <a:ea typeface="Noto Sans KR ExtraBold" panose="020B0200000000000000" pitchFamily="50" charset="-127"/>
-            </a:endParaRPr>
-          </a:p>
-        </p:txBody>
-      </p:sp>
-      <p:sp>
-        <p:nvSpPr>
-          <p:cNvPr id="11" name="TextBox 5">
-            <a:extLst>
-              <a:ext uri="{FF2B5EF4-FFF2-40B4-BE49-F238E27FC236}">
-                <a16:creationId xmlns:a16="http://schemas.microsoft.com/office/drawing/2014/main" id="{B0E935DB-29A0-40F2-9001-25D4CF363EA9}"/>
-              </a:ext>
-            </a:extLst>
-          </p:cNvPr>
-          <p:cNvSpPr txBox="1"/>
-          <p:nvPr/>
-        </p:nvSpPr>
-        <p:spPr>
-          <a:xfrm>
-            <a:off x="606600" y="10381656"/>
-            <a:ext cx="10185400" cy="2558621"/>
-          </a:xfrm>
-          <a:prstGeom prst="rect">
-            <a:avLst/>
-          </a:prstGeom>
-        </p:spPr>
-        <p:txBody>
-          <a:bodyPr rtlCol="0" anchor="ctr"/>
-          <a:lstStyle/>
-          <a:p>
-            <a:pPr lvl="0" algn="l">
-              <a:lnSpc>
-                <a:spcPct val="155126"/>
-              </a:lnSpc>
-            </a:pPr>
-            <a:r>
-              <a:rPr lang="en-US" altLang="ko-KR" sz="4500" spc="-153" dirty="0">
-                <a:latin typeface="Noto Sans KR ExtraBold" panose="020B0200000000000000" pitchFamily="50" charset="-127"/>
-                <a:ea typeface="Noto Sans KR ExtraBold" panose="020B0200000000000000" pitchFamily="50" charset="-127"/>
-              </a:rPr>
-              <a:t> 3) </a:t>
-            </a:r>
-            <a:r>
-              <a:rPr lang="ko-KR" altLang="en-US" sz="4500" spc="-153" dirty="0">
-                <a:latin typeface="Noto Sans KR ExtraBold" panose="020B0200000000000000" pitchFamily="50" charset="-127"/>
-                <a:ea typeface="Noto Sans KR ExtraBold" panose="020B0200000000000000" pitchFamily="50" charset="-127"/>
-              </a:rPr>
-              <a:t>실제 모델의 성능을 의료진에게</a:t>
-            </a:r>
-            <a:endParaRPr lang="en-US" altLang="ko-KR" sz="4500" spc="-153" dirty="0">
-              <a:latin typeface="Noto Sans KR ExtraBold" panose="020B0200000000000000" pitchFamily="50" charset="-127"/>
-              <a:ea typeface="Noto Sans KR ExtraBold" panose="020B0200000000000000" pitchFamily="50" charset="-127"/>
-            </a:endParaRPr>
-          </a:p>
-          <a:p>
-            <a:pPr lvl="0" algn="l">
-              <a:lnSpc>
-                <a:spcPct val="155126"/>
-              </a:lnSpc>
-            </a:pPr>
-            <a:r>
-              <a:rPr lang="en-US" altLang="ko-KR" sz="4500" spc="-153" dirty="0">
-                <a:latin typeface="Noto Sans KR ExtraBold" panose="020B0200000000000000" pitchFamily="50" charset="-127"/>
-                <a:ea typeface="Noto Sans KR ExtraBold" panose="020B0200000000000000" pitchFamily="50" charset="-127"/>
-              </a:rPr>
-              <a:t>       </a:t>
-            </a:r>
-            <a:r>
-              <a:rPr lang="ko-KR" altLang="en-US" sz="4500" spc="-153" dirty="0" err="1">
-                <a:solidFill>
-                  <a:srgbClr val="FF0000"/>
-                </a:solidFill>
-                <a:latin typeface="Noto Sans KR ExtraBold" panose="020B0200000000000000" pitchFamily="50" charset="-127"/>
-                <a:ea typeface="Noto Sans KR ExtraBold" panose="020B0200000000000000" pitchFamily="50" charset="-127"/>
-              </a:rPr>
-              <a:t>검토받는</a:t>
-            </a:r>
-            <a:r>
-              <a:rPr lang="ko-KR" altLang="en-US" sz="4500" spc="-153" dirty="0">
-                <a:solidFill>
-                  <a:srgbClr val="FF0000"/>
-                </a:solidFill>
-                <a:latin typeface="Noto Sans KR ExtraBold" panose="020B0200000000000000" pitchFamily="50" charset="-127"/>
-                <a:ea typeface="Noto Sans KR ExtraBold" panose="020B0200000000000000" pitchFamily="50" charset="-127"/>
-              </a:rPr>
-              <a:t> 신뢰 확보 작업</a:t>
-            </a:r>
-            <a:r>
-              <a:rPr lang="ko-KR" altLang="en-US" sz="4500" spc="-153" dirty="0">
-                <a:latin typeface="Noto Sans KR ExtraBold" panose="020B0200000000000000" pitchFamily="50" charset="-127"/>
-                <a:ea typeface="Noto Sans KR ExtraBold" panose="020B0200000000000000" pitchFamily="50" charset="-127"/>
-              </a:rPr>
-              <a:t> 필요</a:t>
             </a:r>
             <a:endParaRPr lang="en-US" altLang="ko-KR" sz="4500" b="0" i="0" u="none" strike="noStrike" spc="-153" dirty="0">
               <a:latin typeface="Noto Sans KR ExtraBold" panose="020B0200000000000000" pitchFamily="50" charset="-127"/>
@@ -16531,7 +17171,7 @@
         </p:nvSpPr>
         <p:spPr>
           <a:xfrm>
-            <a:off x="10699655" y="7557050"/>
+            <a:off x="10699655" y="8784280"/>
             <a:ext cx="10923969" cy="2961910"/>
           </a:xfrm>
           <a:prstGeom prst="rect">
@@ -16552,7 +17192,21 @@
                 <a:latin typeface="Noto Sans KR ExtraBold" panose="020B0200000000000000" pitchFamily="50" charset="-127"/>
                 <a:ea typeface="Noto Sans KR ExtraBold" panose="020B0200000000000000" pitchFamily="50" charset="-127"/>
               </a:rPr>
-              <a:t> 2) DICOM </a:t>
+              <a:t> 2) </a:t>
+            </a:r>
+            <a:r>
+              <a:rPr lang="en-US" altLang="ko-KR" sz="4500" spc="-153" dirty="0">
+                <a:latin typeface="Roboto Condensed ExtraBold" panose="02000000000000000000" pitchFamily="2" charset="0"/>
+                <a:ea typeface="Roboto Condensed ExtraBold" panose="02000000000000000000" pitchFamily="2" charset="0"/>
+              </a:rPr>
+              <a:t>DICOM</a:t>
+            </a:r>
+            <a:r>
+              <a:rPr lang="en-US" altLang="ko-KR" sz="4500" spc="-153" dirty="0">
+                <a:latin typeface="Noto Sans KR ExtraBold" panose="020B0200000000000000" pitchFamily="50" charset="-127"/>
+                <a:ea typeface="Noto Sans KR ExtraBold" panose="020B0200000000000000" pitchFamily="50" charset="-127"/>
+              </a:rPr>
+              <a:t> </a:t>
             </a:r>
             <a:r>
               <a:rPr lang="ko-KR" altLang="en-US" sz="4500" spc="-153" dirty="0">
@@ -16566,7 +17220,14 @@
                 <a:latin typeface="Noto Sans KR ExtraBold" panose="020B0200000000000000" pitchFamily="50" charset="-127"/>
                 <a:ea typeface="Noto Sans KR ExtraBold" panose="020B0200000000000000" pitchFamily="50" charset="-127"/>
               </a:rPr>
-              <a:t>→ JPG</a:t>
+              <a:t>→ </a:t>
+            </a:r>
+            <a:r>
+              <a:rPr lang="en-US" altLang="ko-KR" sz="4500" spc="-153" dirty="0">
+                <a:latin typeface="Roboto Condensed ExtraBold" panose="02000000000000000000" pitchFamily="2" charset="0"/>
+                <a:ea typeface="Roboto Condensed ExtraBold" panose="02000000000000000000" pitchFamily="2" charset="0"/>
+              </a:rPr>
+              <a:t>JPG</a:t>
             </a:r>
             <a:r>
               <a:rPr lang="ko-KR" altLang="en-US" sz="4500" spc="-153" dirty="0">
@@ -16591,85 +17252,6 @@
                 <a:latin typeface="Noto Sans KR ExtraBold" panose="020B0200000000000000" pitchFamily="50" charset="-127"/>
                 <a:ea typeface="Noto Sans KR ExtraBold" panose="020B0200000000000000" pitchFamily="50" charset="-127"/>
               </a:rPr>
-              <a:t>    - DICOM </a:t>
-            </a:r>
-            <a:r>
-              <a:rPr lang="ko-KR" altLang="en-US" sz="4500" spc="-153" dirty="0">
-                <a:latin typeface="Noto Sans KR ExtraBold" panose="020B0200000000000000" pitchFamily="50" charset="-127"/>
-                <a:ea typeface="Noto Sans KR ExtraBold" panose="020B0200000000000000" pitchFamily="50" charset="-127"/>
-              </a:rPr>
-              <a:t>형식도 실제 서비스에서 사용 가능</a:t>
-            </a:r>
-            <a:endParaRPr lang="en-US" altLang="ko-KR" sz="4500" b="0" i="0" u="none" strike="noStrike" spc="-153" dirty="0">
-              <a:latin typeface="Noto Sans KR ExtraBold" panose="020B0200000000000000" pitchFamily="50" charset="-127"/>
-              <a:ea typeface="Noto Sans KR ExtraBold" panose="020B0200000000000000" pitchFamily="50" charset="-127"/>
-            </a:endParaRPr>
-          </a:p>
-        </p:txBody>
-      </p:sp>
-      <p:sp>
-        <p:nvSpPr>
-          <p:cNvPr id="13" name="TextBox 5">
-            <a:extLst>
-              <a:ext uri="{FF2B5EF4-FFF2-40B4-BE49-F238E27FC236}">
-                <a16:creationId xmlns:a16="http://schemas.microsoft.com/office/drawing/2014/main" id="{4975F728-3E6A-4D34-A761-13BD533D4CCD}"/>
-              </a:ext>
-            </a:extLst>
-          </p:cNvPr>
-          <p:cNvSpPr txBox="1"/>
-          <p:nvPr/>
-        </p:nvSpPr>
-        <p:spPr>
-          <a:xfrm>
-            <a:off x="10774414" y="10180011"/>
-            <a:ext cx="10563126" cy="2961910"/>
-          </a:xfrm>
-          <a:prstGeom prst="rect">
-            <a:avLst/>
-          </a:prstGeom>
-        </p:spPr>
-        <p:txBody>
-          <a:bodyPr rtlCol="0" anchor="ctr"/>
-          <a:lstStyle/>
-          <a:p>
-            <a:pPr lvl="0" algn="l">
-              <a:lnSpc>
-                <a:spcPct val="155126"/>
-              </a:lnSpc>
-            </a:pPr>
-            <a:r>
-              <a:rPr lang="en-US" altLang="ko-KR" sz="4500" spc="-153" dirty="0">
-                <a:latin typeface="Noto Sans KR ExtraBold" panose="020B0200000000000000" pitchFamily="50" charset="-127"/>
-                <a:ea typeface="Noto Sans KR ExtraBold" panose="020B0200000000000000" pitchFamily="50" charset="-127"/>
-              </a:rPr>
-              <a:t> 3) </a:t>
-            </a:r>
-            <a:r>
-              <a:rPr lang="ko-KR" altLang="en-US" sz="4500" spc="-153" dirty="0">
-                <a:latin typeface="Noto Sans KR ExtraBold" panose="020B0200000000000000" pitchFamily="50" charset="-127"/>
-                <a:ea typeface="Noto Sans KR ExtraBold" panose="020B0200000000000000" pitchFamily="50" charset="-127"/>
-              </a:rPr>
-              <a:t>웹 배포</a:t>
-            </a:r>
-            <a:r>
-              <a:rPr lang="en-US" altLang="ko-KR" sz="4500" spc="-153" dirty="0">
-                <a:latin typeface="Noto Sans KR ExtraBold" panose="020B0200000000000000" pitchFamily="50" charset="-127"/>
-                <a:ea typeface="Noto Sans KR ExtraBold" panose="020B0200000000000000" pitchFamily="50" charset="-127"/>
-              </a:rPr>
-              <a:t> </a:t>
-            </a:r>
-          </a:p>
-          <a:p>
-            <a:pPr lvl="0" algn="l">
-              <a:lnSpc>
-                <a:spcPct val="155126"/>
-              </a:lnSpc>
-            </a:pPr>
-            <a:r>
-              <a:rPr lang="en-US" altLang="ko-KR" sz="4500" spc="-153" dirty="0">
-                <a:latin typeface="Noto Sans KR ExtraBold" panose="020B0200000000000000" pitchFamily="50" charset="-127"/>
-                <a:ea typeface="Noto Sans KR ExtraBold" panose="020B0200000000000000" pitchFamily="50" charset="-127"/>
-              </a:rPr>
               <a:t>    - </a:t>
             </a:r>
             <a:r>
@@ -16677,28 +17259,21 @@
                 <a:latin typeface="Roboto Condensed ExtraBold" panose="02000000000000000000" pitchFamily="2" charset="0"/>
                 <a:ea typeface="Roboto Condensed ExtraBold" panose="02000000000000000000" pitchFamily="2" charset="0"/>
               </a:rPr>
-              <a:t>AWS/</a:t>
-            </a:r>
-            <a:r>
-              <a:rPr lang="en-US" altLang="ko-KR" sz="4500" spc="-153" dirty="0" err="1">
-                <a:latin typeface="Roboto Condensed ExtraBold" panose="02000000000000000000" pitchFamily="2" charset="0"/>
-                <a:ea typeface="Roboto Condensed ExtraBold" panose="02000000000000000000" pitchFamily="2" charset="0"/>
-              </a:rPr>
-              <a:t>Streamlit</a:t>
+              <a:t>DICOM</a:t>
             </a:r>
             <a:r>
               <a:rPr lang="en-US" altLang="ko-KR" sz="4500" spc="-153" dirty="0">
-                <a:latin typeface="Roboto Condensed ExtraBold" panose="02000000000000000000" pitchFamily="2" charset="0"/>
-                <a:ea typeface="Roboto Condensed ExtraBold" panose="02000000000000000000" pitchFamily="2" charset="0"/>
-              </a:rPr>
-              <a:t> Cloud</a:t>
+                <a:latin typeface="Noto Sans KR ExtraBold" panose="020B0200000000000000" pitchFamily="50" charset="-127"/>
+                <a:ea typeface="Noto Sans KR ExtraBold" panose="020B0200000000000000" pitchFamily="50" charset="-127"/>
+              </a:rPr>
+              <a:t> </a:t>
             </a:r>
             <a:r>
               <a:rPr lang="ko-KR" altLang="en-US" sz="4500" spc="-153" dirty="0">
                 <a:latin typeface="Noto Sans KR ExtraBold" panose="020B0200000000000000" pitchFamily="50" charset="-127"/>
                 <a:ea typeface="Noto Sans KR ExtraBold" panose="020B0200000000000000" pitchFamily="50" charset="-127"/>
               </a:rPr>
-              <a:t>로 웹 접근성 향상</a:t>
+              <a:t>형식도 실제 서비스에서 사용 가능</a:t>
             </a:r>
             <a:endParaRPr lang="en-US" altLang="ko-KR" sz="4500" b="0" i="0" u="none" strike="noStrike" spc="-153" dirty="0">
               <a:latin typeface="Noto Sans KR ExtraBold" panose="020B0200000000000000" pitchFamily="50" charset="-127"/>
@@ -16763,7 +17338,7 @@
 </p:sld>
 </file>
 
-<file path=ppt/slides/slide23.xml><?xml version="1.0" encoding="utf-8"?>
+<file path=ppt/slides/slide24.xml><?xml version="1.0" encoding="utf-8"?>
 <p:sld xmlns:a="http://schemas.openxmlformats.org/drawingml/2006/main" xmlns:r="http://schemas.openxmlformats.org/officeDocument/2006/relationships" xmlns:p="http://schemas.openxmlformats.org/presentationml/2006/main">
   <p:cSld>
     <p:bg>
@@ -16845,7 +17420,7 @@
 </p:sld>
 </file>
 
-<file path=ppt/slides/slide24.xml><?xml version="1.0" encoding="utf-8"?>
+<file path=ppt/slides/slide25.xml><?xml version="1.0" encoding="utf-8"?>
 <p:sld xmlns:a="http://schemas.openxmlformats.org/drawingml/2006/main" xmlns:r="http://schemas.openxmlformats.org/officeDocument/2006/relationships" xmlns:p="http://schemas.openxmlformats.org/presentationml/2006/main">
   <p:cSld>
     <p:bg>
@@ -18106,7 +18681,7 @@
           <p:nvPr>
             <p:extLst>
               <p:ext uri="{D42A27DB-BD31-4B8C-83A1-F6EECF244321}">
-                <p14:modId xmlns:p14="http://schemas.microsoft.com/office/powerpoint/2010/main" val="369064939"/>
+                <p14:modId xmlns:p14="http://schemas.microsoft.com/office/powerpoint/2010/main" val="3899016767"/>
               </p:ext>
             </p:extLst>
           </p:nvPr>
@@ -20030,8 +20605,8 @@
                           <a:solidFill>
                             <a:schemeClr val="tx1"/>
                           </a:solidFill>
-                          <a:latin typeface="Noto Sans KR ExtraBold" panose="020B0200000000000000" pitchFamily="50" charset="-127"/>
-                          <a:ea typeface="Noto Sans KR ExtraBold" panose="020B0200000000000000" pitchFamily="50" charset="-127"/>
+                          <a:latin typeface="Roboto Condensed ExtraBold" panose="02000000000000000000" pitchFamily="2" charset="0"/>
+                          <a:ea typeface="Roboto Condensed ExtraBold" panose="02000000000000000000" pitchFamily="2" charset="0"/>
                         </a:rPr>
                         <a:t>Spring Security</a:t>
                       </a:r>
@@ -20048,10 +20623,20 @@
                           <a:solidFill>
                             <a:schemeClr val="tx1"/>
                           </a:solidFill>
-                          <a:latin typeface="Noto Sans KR ExtraBold" panose="020B0200000000000000" pitchFamily="50" charset="-127"/>
+                          <a:latin typeface="Roboto Condensed ExtraBold" panose="02000000000000000000" pitchFamily="2" charset="0"/>
+                          <a:ea typeface="Roboto Condensed ExtraBold" panose="02000000000000000000" pitchFamily="2" charset="0"/>
+                        </a:rPr>
+                        <a:t> + JWT</a:t>
+                      </a:r>
+                      <a:r>
+                        <a:rPr lang="ko-KR" altLang="en-US" sz="3500" b="1" dirty="0">
+                          <a:solidFill>
+                            <a:schemeClr val="tx1"/>
+                          </a:solidFill>
+                          <a:latin typeface="Roboto Condensed ExtraBold" panose="02000000000000000000" pitchFamily="2" charset="0"/>
                           <a:ea typeface="Noto Sans KR ExtraBold" panose="020B0200000000000000" pitchFamily="50" charset="-127"/>
                         </a:rPr>
-                        <a:t> + JWT</a:t>
+                        <a:t> </a:t>
                       </a:r>
                       <a:r>
                         <a:rPr lang="ko-KR" altLang="en-US" sz="3500" b="1" dirty="0">
@@ -20061,7 +20646,7 @@
                           <a:latin typeface="Noto Sans KR ExtraBold" panose="020B0200000000000000" pitchFamily="50" charset="-127"/>
                           <a:ea typeface="Noto Sans KR ExtraBold" panose="020B0200000000000000" pitchFamily="50" charset="-127"/>
                         </a:rPr>
-                        <a:t> 적용</a:t>
+                        <a:t>적용</a:t>
                       </a:r>
                       <a:endParaRPr lang="en-US" sz="3500" b="1" dirty="0">
                         <a:solidFill>
@@ -20335,6 +20920,36 @@
                         <a:defRPr/>
                       </a:pPr>
                       <a:r>
+                        <a:rPr lang="en-US" altLang="ko-KR" sz="3500" b="1" i="0" u="none" strike="noStrike" dirty="0">
+                          <a:solidFill>
+                            <a:schemeClr val="tx1"/>
+                          </a:solidFill>
+                          <a:latin typeface="Roboto Condensed ExtraBold" panose="02000000000000000000" pitchFamily="2" charset="0"/>
+                          <a:ea typeface="Roboto Condensed ExtraBold" panose="02000000000000000000" pitchFamily="2" charset="0"/>
+                        </a:rPr>
+                        <a:t>AWS </a:t>
+                      </a:r>
+                      <a:r>
+                        <a:rPr lang="en-US" altLang="ko-KR" sz="3500" b="1" i="0" u="none" strike="noStrike" dirty="0" err="1">
+                          <a:solidFill>
+                            <a:schemeClr val="tx1"/>
+                          </a:solidFill>
+                          <a:latin typeface="Roboto Condensed ExtraBold" panose="02000000000000000000" pitchFamily="2" charset="0"/>
+                          <a:ea typeface="Roboto Condensed ExtraBold" panose="02000000000000000000" pitchFamily="2" charset="0"/>
+                        </a:rPr>
+                        <a:t>Lightsail</a:t>
+                      </a:r>
+                      <a:r>
+                        <a:rPr lang="en-US" altLang="ko-KR" sz="3500" b="1" i="0" u="none" strike="noStrike" dirty="0">
+                          <a:solidFill>
+                            <a:schemeClr val="tx1"/>
+                          </a:solidFill>
+                          <a:latin typeface="Noto Sans KR ExtraBold" panose="020B0200000000000000" pitchFamily="50" charset="-127"/>
+                          <a:ea typeface="Noto Sans KR ExtraBold" panose="020B0200000000000000" pitchFamily="50" charset="-127"/>
+                        </a:rPr>
+                        <a:t> </a:t>
+                      </a:r>
+                      <a:r>
                         <a:rPr lang="ko-KR" altLang="en-US" sz="3500" b="1" i="0" u="none" strike="noStrike" dirty="0">
                           <a:solidFill>
                             <a:schemeClr val="tx1"/>
@@ -20342,7 +20957,7 @@
                           <a:latin typeface="Noto Sans KR ExtraBold" panose="020B0200000000000000" pitchFamily="50" charset="-127"/>
                           <a:ea typeface="Noto Sans KR ExtraBold" panose="020B0200000000000000" pitchFamily="50" charset="-127"/>
                         </a:rPr>
-                        <a:t>모델 로드 및 예측 기능 구현</a:t>
+                        <a:t>웹 배포 작업</a:t>
                       </a:r>
                       <a:endParaRPr lang="en-US" sz="3500" b="1" dirty="0">
                         <a:solidFill>
@@ -21308,13 +21923,38 @@
               </a:rPr>
               <a:t>Suite(STS)</a:t>
             </a:r>
+          </a:p>
+          <a:p>
+            <a:pPr lvl="0" algn="l">
+              <a:lnSpc>
+                <a:spcPct val="155126"/>
+              </a:lnSpc>
+            </a:pPr>
             <a:r>
               <a:rPr lang="en-US" sz="5000" spc="-140" dirty="0">
                 <a:latin typeface="Roboto Condensed ExtraBold" panose="02000000000000000000" pitchFamily="2" charset="0"/>
                 <a:ea typeface="Roboto Condensed ExtraBold" panose="02000000000000000000" pitchFamily="2" charset="0"/>
               </a:rPr>
-              <a:t> </a:t>
-            </a:r>
+              <a:t>      </a:t>
+            </a:r>
+            <a:r>
+              <a:rPr lang="en-US" altLang="ko-KR" sz="5000" spc="-140" dirty="0">
+                <a:latin typeface="Roboto Condensed ExtraBold" panose="02000000000000000000" pitchFamily="2" charset="0"/>
+                <a:ea typeface="Roboto Condensed ExtraBold" panose="02000000000000000000" pitchFamily="2" charset="0"/>
+              </a:rPr>
+              <a:t> - AWS </a:t>
+            </a:r>
+            <a:r>
+              <a:rPr lang="en-US" altLang="ko-KR" sz="5000" spc="-140" dirty="0" err="1">
+                <a:latin typeface="Roboto Condensed ExtraBold" panose="02000000000000000000" pitchFamily="2" charset="0"/>
+                <a:ea typeface="Roboto Condensed ExtraBold" panose="02000000000000000000" pitchFamily="2" charset="0"/>
+              </a:rPr>
+              <a:t>Lightsail</a:t>
+            </a:r>
+            <a:endParaRPr lang="en-US" sz="5000" spc="-140" dirty="0">
+              <a:latin typeface="Roboto Condensed ExtraBold" panose="02000000000000000000" pitchFamily="2" charset="0"/>
+              <a:ea typeface="Roboto Condensed ExtraBold" panose="02000000000000000000" pitchFamily="2" charset="0"/>
+            </a:endParaRPr>
           </a:p>
           <a:p>
             <a:pPr lvl="0" algn="l">
@@ -22694,7 +23334,7 @@
                 <a:latin typeface="Noto Sans KR ExtraBold" panose="020B0200000000000000" pitchFamily="50" charset="-127"/>
                 <a:ea typeface="Noto Sans KR ExtraBold" panose="020B0200000000000000" pitchFamily="50" charset="-127"/>
               </a:rPr>
-              <a:t>개발</a:t>
+              <a:t>개발 및 웹 배포</a:t>
             </a:r>
             <a:endParaRPr lang="en-US" altLang="ko-KR" sz="4000" b="0" i="0" u="none" strike="noStrike" dirty="0">
               <a:latin typeface="Noto Sans KR ExtraBold" panose="020B0200000000000000" pitchFamily="50" charset="-127"/>
@@ -23878,9 +24518,9 @@
         <p:grpSpPr>
           <a:xfrm>
             <a:off x="18841572" y="6079138"/>
-            <a:ext cx="6075828" cy="4055462"/>
+            <a:ext cx="5851957" cy="4055462"/>
             <a:chOff x="2057400" y="3546613"/>
-            <a:chExt cx="6075828" cy="4055462"/>
+            <a:chExt cx="5851957" cy="4055462"/>
           </a:xfrm>
         </p:grpSpPr>
         <p:pic>
@@ -23932,7 +24572,7 @@
           </p:nvSpPr>
           <p:spPr>
             <a:xfrm>
-              <a:off x="2723028" y="5074279"/>
+              <a:off x="2499157" y="4724400"/>
               <a:ext cx="5410200" cy="1994396"/>
             </a:xfrm>
             <a:prstGeom prst="rect">
@@ -23956,7 +24596,31 @@
                   <a:latin typeface="Noto Sans KR ExtraBold" panose="020B0200000000000000" pitchFamily="50" charset="-127"/>
                   <a:ea typeface="Noto Sans KR ExtraBold" panose="020B0200000000000000" pitchFamily="50" charset="-127"/>
                 </a:rPr>
-                <a:t>대시 보드 구현</a:t>
+                <a:t>대시 보드 구현 및</a:t>
+              </a:r>
+              <a:endParaRPr lang="en-US" altLang="ko-KR" sz="4000" b="0" i="0" u="none" strike="noStrike" dirty="0">
+                <a:solidFill>
+                  <a:srgbClr val="197A52"/>
+                </a:solidFill>
+                <a:latin typeface="Noto Sans KR ExtraBold" panose="020B0200000000000000" pitchFamily="50" charset="-127"/>
+                <a:ea typeface="Noto Sans KR ExtraBold" panose="020B0200000000000000" pitchFamily="50" charset="-127"/>
+              </a:endParaRPr>
+            </a:p>
+            <a:p>
+              <a:pPr lvl="0">
+                <a:lnSpc>
+                  <a:spcPct val="150000"/>
+                </a:lnSpc>
+              </a:pPr>
+              <a:r>
+                <a:rPr lang="ko-KR" altLang="en-US" sz="4000" dirty="0">
+                  <a:solidFill>
+                    <a:srgbClr val="197A52"/>
+                  </a:solidFill>
+                  <a:latin typeface="Noto Sans KR ExtraBold" panose="020B0200000000000000" pitchFamily="50" charset="-127"/>
+                  <a:ea typeface="Noto Sans KR ExtraBold" panose="020B0200000000000000" pitchFamily="50" charset="-127"/>
+                </a:rPr>
+                <a:t>        웹 배포</a:t>
               </a:r>
               <a:endParaRPr lang="en-US" altLang="ko-KR" sz="4000" b="0" i="0" u="none" strike="noStrike" dirty="0">
                 <a:solidFill>

</xml_diff>